<commit_message>
entrenamiento del avanzado. Misiones + sistema de ayudas
</commit_message>
<xml_diff>
--- a/defensa/contenidos-tactica/trabajo-avanzado.pptx
+++ b/defensa/contenidos-tactica/trabajo-avanzado.pptx
@@ -4261,7 +4261,7 @@
           <a:p>
             <a:r>
               <a:rPr lang="es-ES" sz="2800" dirty="0" smtClean="0"/>
-              <a:t>Trabajo de los 2º defensores </a:t>
+              <a:t>Trabajo del Avanzado</a:t>
             </a:r>
             <a:endParaRPr lang="es-ES" sz="2800" dirty="0"/>
           </a:p>
@@ -4328,45 +4328,7 @@
                           </a:effectLst>
                           <a:latin typeface="Tahoma" pitchFamily="34" charset="0"/>
                         </a:rPr>
-                        <a:t>Trabajo </a:t>
-                      </a:r>
-                      <a:r>
-                        <a:rPr kumimoji="0" lang="es-ES" sz="1600" b="1" i="1" u="sng" strike="noStrike" cap="none" normalizeH="0" baseline="0" dirty="0" smtClean="0">
-                          <a:ln>
-                            <a:noFill/>
-                          </a:ln>
-                          <a:solidFill>
-                            <a:schemeClr val="tx1"/>
-                          </a:solidFill>
-                          <a:effectLst>
-                            <a:outerShdw blurRad="38100" dist="38100" dir="2700000" algn="tl">
-                              <a:srgbClr val="000000">
-                                <a:alpha val="43137"/>
-                              </a:srgbClr>
-                            </a:outerShdw>
-                          </a:effectLst>
-                          <a:latin typeface="Tahoma" pitchFamily="34" charset="0"/>
-                        </a:rPr>
-                        <a:t>de </a:t>
-                      </a:r>
-                      <a:r>
-                        <a:rPr kumimoji="0" lang="es-ES" sz="1600" b="1" i="1" u="sng" strike="noStrike" cap="none" normalizeH="0" baseline="0" dirty="0" smtClean="0">
-                          <a:ln>
-                            <a:noFill/>
-                          </a:ln>
-                          <a:solidFill>
-                            <a:schemeClr val="tx1"/>
-                          </a:solidFill>
-                          <a:effectLst>
-                            <a:outerShdw blurRad="38100" dist="38100" dir="2700000" algn="tl">
-                              <a:srgbClr val="000000">
-                                <a:alpha val="43137"/>
-                              </a:srgbClr>
-                            </a:outerShdw>
-                          </a:effectLst>
-                          <a:latin typeface="Tahoma" pitchFamily="34" charset="0"/>
-                        </a:rPr>
-                        <a:t>1x1</a:t>
+                        <a:t>Trabajo de 1x1</a:t>
                       </a:r>
                     </a:p>
                     <a:p>
@@ -4399,16 +4361,6 @@
                         </a:rPr>
                         <a:t>(Ver funciones/misiones del avanzado)</a:t>
                       </a:r>
-                      <a:endParaRPr kumimoji="0" lang="es-ES" sz="1200" b="0" i="1" u="none" strike="noStrike" cap="none" normalizeH="0" baseline="0" dirty="0" smtClean="0">
-                        <a:ln>
-                          <a:noFill/>
-                        </a:ln>
-                        <a:solidFill>
-                          <a:schemeClr val="tx1"/>
-                        </a:solidFill>
-                        <a:effectLst/>
-                        <a:latin typeface="Tahoma" pitchFamily="34" charset="0"/>
-                      </a:endParaRPr>
                     </a:p>
                   </a:txBody>
                   <a:tcPr horzOverflow="overflow"/>
@@ -4530,87 +4482,6 @@
                         <a:buClrTx/>
                         <a:buSzTx/>
                         <a:buFont typeface="+mj-lt"/>
-                        <a:buAutoNum type="alphaLcPeriod"/>
-                        <a:tabLst/>
-                        <a:defRPr/>
-                      </a:pPr>
-                      <a:r>
-                        <a:rPr kumimoji="0" lang="es-ES" sz="1600" b="1" i="1" u="none" strike="noStrike" kern="1200" cap="none" spc="0" normalizeH="0" baseline="0" noProof="0" dirty="0" smtClean="0">
-                          <a:ln>
-                            <a:noFill/>
-                          </a:ln>
-                          <a:solidFill>
-                            <a:prstClr val="black"/>
-                          </a:solidFill>
-                          <a:effectLst>
-                            <a:outerShdw blurRad="38100" dist="38100" dir="2700000" algn="tl">
-                              <a:srgbClr val="000000">
-                                <a:alpha val="43137"/>
-                              </a:srgbClr>
-                            </a:outerShdw>
-                          </a:effectLst>
-                          <a:uLnTx/>
-                          <a:uFillTx/>
-                          <a:latin typeface="Tahoma" pitchFamily="34" charset="0"/>
-                          <a:ea typeface="+mn-ea"/>
-                          <a:cs typeface="+mn-cs"/>
-                        </a:rPr>
-                        <a:t>6:0</a:t>
-                      </a:r>
-                    </a:p>
-                    <a:p>
-                      <a:pPr marL="342900" marR="0" lvl="0" indent="-342900" algn="l" defTabSz="914400" rtl="0" eaLnBrk="1" fontAlgn="base" latinLnBrk="0" hangingPunct="1">
-                        <a:lnSpc>
-                          <a:spcPct val="100000"/>
-                        </a:lnSpc>
-                        <a:spcBef>
-                          <a:spcPct val="20000"/>
-                        </a:spcBef>
-                        <a:spcAft>
-                          <a:spcPct val="0"/>
-                        </a:spcAft>
-                        <a:buClrTx/>
-                        <a:buSzTx/>
-                        <a:buFont typeface="+mj-lt"/>
-                        <a:buAutoNum type="alphaLcPeriod"/>
-                        <a:tabLst/>
-                        <a:defRPr/>
-                      </a:pPr>
-                      <a:endParaRPr kumimoji="0" lang="es-ES" sz="1600" b="1" i="1" u="none" strike="noStrike" kern="1200" cap="none" spc="0" normalizeH="0" baseline="0" noProof="0" dirty="0" smtClean="0">
-                        <a:ln>
-                          <a:noFill/>
-                        </a:ln>
-                        <a:solidFill>
-                          <a:prstClr val="black"/>
-                        </a:solidFill>
-                        <a:effectLst>
-                          <a:outerShdw blurRad="38100" dist="38100" dir="2700000" algn="tl">
-                            <a:srgbClr val="000000">
-                              <a:alpha val="43137"/>
-                            </a:srgbClr>
-                          </a:outerShdw>
-                        </a:effectLst>
-                        <a:uLnTx/>
-                        <a:uFillTx/>
-                        <a:latin typeface="Tahoma" pitchFamily="34" charset="0"/>
-                        <a:ea typeface="+mn-ea"/>
-                        <a:cs typeface="+mn-cs"/>
-                      </a:endParaRPr>
-                    </a:p>
-                    <a:p>
-                      <a:pPr marL="342900" marR="0" lvl="0" indent="-342900" algn="l" defTabSz="914400" rtl="0" eaLnBrk="1" fontAlgn="base" latinLnBrk="0" hangingPunct="1">
-                        <a:lnSpc>
-                          <a:spcPct val="100000"/>
-                        </a:lnSpc>
-                        <a:spcBef>
-                          <a:spcPct val="20000"/>
-                        </a:spcBef>
-                        <a:spcAft>
-                          <a:spcPct val="0"/>
-                        </a:spcAft>
-                        <a:buClrTx/>
-                        <a:buSzTx/>
-                        <a:buFont typeface="+mj-lt"/>
                         <a:buNone/>
                         <a:tabLst/>
                         <a:defRPr/>
@@ -4635,48 +4506,6 @@
                         <a:ea typeface="+mn-ea"/>
                         <a:cs typeface="+mn-cs"/>
                       </a:endParaRPr>
-                    </a:p>
-                    <a:p>
-                      <a:pPr marL="342900" marR="0" lvl="0" indent="-342900" algn="l" defTabSz="914400" rtl="0" eaLnBrk="1" fontAlgn="base" latinLnBrk="0" hangingPunct="1">
-                        <a:lnSpc>
-                          <a:spcPct val="100000"/>
-                        </a:lnSpc>
-                        <a:spcBef>
-                          <a:spcPct val="20000"/>
-                        </a:spcBef>
-                        <a:spcAft>
-                          <a:spcPct val="0"/>
-                        </a:spcAft>
-                        <a:buClrTx/>
-                        <a:buSzTx/>
-                        <a:buFont typeface="+mj-lt"/>
-                        <a:buAutoNum type="alphaLcPeriod"/>
-                        <a:tabLst/>
-                        <a:defRPr/>
-                      </a:pPr>
-                      <a:r>
-                        <a:rPr kumimoji="0" lang="es-ES" sz="1600" b="1" i="1" u="none" strike="noStrike" kern="1200" cap="none" spc="0" normalizeH="0" baseline="0" noProof="0" dirty="0" smtClean="0">
-                          <a:ln>
-                            <a:noFill/>
-                          </a:ln>
-                          <a:solidFill>
-                            <a:prstClr val="black"/>
-                          </a:solidFill>
-                          <a:effectLst>
-                            <a:outerShdw blurRad="38100" dist="38100" dir="2700000" algn="tl">
-                              <a:srgbClr val="000000">
-                                <a:alpha val="43137"/>
-                              </a:srgbClr>
-                            </a:outerShdw>
-                          </a:effectLst>
-                          <a:uLnTx/>
-                          <a:uFillTx/>
-                          <a:latin typeface="Tahoma" pitchFamily="34" charset="0"/>
-                          <a:ea typeface="+mn-ea"/>
-                          <a:cs typeface="+mn-cs"/>
-                        </a:rPr>
-                        <a:t>5:1</a:t>
-                      </a:r>
                     </a:p>
                     <a:p>
                       <a:pPr marL="0" marR="0" lvl="0" indent="0" algn="l" defTabSz="914400" rtl="0" eaLnBrk="1" fontAlgn="base" latinLnBrk="0" hangingPunct="1">
@@ -5887,51 +5716,15 @@
       </p:grpSp>
       <p:sp>
         <p:nvSpPr>
-          <p:cNvPr id="77" name="Oval 35"/>
+          <p:cNvPr id="78" name="AutoShape 36"/>
           <p:cNvSpPr>
             <a:spLocks noChangeArrowheads="1"/>
           </p:cNvSpPr>
           <p:nvPr/>
         </p:nvSpPr>
         <p:spPr bwMode="auto">
-          <a:xfrm rot="10800000">
-            <a:off x="8072462" y="4643444"/>
-            <a:ext cx="142877" cy="145426"/>
-          </a:xfrm>
-          <a:prstGeom prst="ellipse">
-            <a:avLst/>
-          </a:prstGeom>
-          <a:solidFill>
-            <a:srgbClr val="0000FF"/>
-          </a:solidFill>
-          <a:ln w="9525">
-            <a:solidFill>
-              <a:srgbClr val="0000FF"/>
-            </a:solidFill>
-            <a:round/>
-            <a:headEnd/>
-            <a:tailEnd/>
-          </a:ln>
-        </p:spPr>
-        <p:txBody>
-          <a:bodyPr/>
-          <a:lstStyle/>
-          <a:p>
-            <a:endParaRPr lang="es-ES"/>
-          </a:p>
-        </p:txBody>
-      </p:sp>
-      <p:sp>
-        <p:nvSpPr>
-          <p:cNvPr id="78" name="AutoShape 36"/>
-          <p:cNvSpPr>
-            <a:spLocks noChangeArrowheads="1"/>
-          </p:cNvSpPr>
-          <p:nvPr/>
-        </p:nvSpPr>
-        <p:spPr bwMode="auto">
-          <a:xfrm rot="12614040" flipV="1">
-            <a:off x="7308039" y="5116313"/>
+          <a:xfrm rot="10800000" flipV="1">
+            <a:off x="6879411" y="4581676"/>
             <a:ext cx="214315" cy="142876"/>
           </a:xfrm>
           <a:prstGeom prst="triangle">
@@ -5969,7 +5762,7 @@
         </p:nvSpPr>
         <p:spPr bwMode="auto">
           <a:xfrm rot="10800000" flipV="1">
-            <a:off x="7000892" y="5214950"/>
+            <a:off x="6535028" y="5214950"/>
             <a:ext cx="37236" cy="105834"/>
           </a:xfrm>
           <a:prstGeom prst="triangle">
@@ -6007,7 +5800,7 @@
         </p:nvSpPr>
         <p:spPr bwMode="auto">
           <a:xfrm rot="10800000" flipV="1">
-            <a:off x="8072462" y="5643576"/>
+            <a:off x="7429521" y="5214950"/>
             <a:ext cx="37236" cy="105834"/>
           </a:xfrm>
           <a:prstGeom prst="triangle">
@@ -6037,87 +5830,15 @@
       </p:sp>
       <p:sp>
         <p:nvSpPr>
-          <p:cNvPr id="81" name="Oval 35"/>
+          <p:cNvPr id="98" name="AutoShape 36"/>
           <p:cNvSpPr>
             <a:spLocks noChangeArrowheads="1"/>
           </p:cNvSpPr>
           <p:nvPr/>
         </p:nvSpPr>
         <p:spPr bwMode="auto">
-          <a:xfrm rot="10800000">
-            <a:off x="8143900" y="4429130"/>
-            <a:ext cx="142877" cy="145426"/>
-          </a:xfrm>
-          <a:prstGeom prst="ellipse">
-            <a:avLst/>
-          </a:prstGeom>
-          <a:solidFill>
-            <a:srgbClr val="0000FF"/>
-          </a:solidFill>
-          <a:ln w="9525">
-            <a:solidFill>
-              <a:srgbClr val="0000FF"/>
-            </a:solidFill>
-            <a:round/>
-            <a:headEnd/>
-            <a:tailEnd/>
-          </a:ln>
-        </p:spPr>
-        <p:txBody>
-          <a:bodyPr/>
-          <a:lstStyle/>
-          <a:p>
-            <a:endParaRPr lang="es-ES"/>
-          </a:p>
-        </p:txBody>
-      </p:sp>
-      <p:sp>
-        <p:nvSpPr>
-          <p:cNvPr id="82" name="Oval 35"/>
-          <p:cNvSpPr>
-            <a:spLocks noChangeArrowheads="1"/>
-          </p:cNvSpPr>
-          <p:nvPr/>
-        </p:nvSpPr>
-        <p:spPr bwMode="auto">
-          <a:xfrm rot="10800000">
-            <a:off x="8215338" y="4214816"/>
-            <a:ext cx="142877" cy="145426"/>
-          </a:xfrm>
-          <a:prstGeom prst="ellipse">
-            <a:avLst/>
-          </a:prstGeom>
-          <a:solidFill>
-            <a:srgbClr val="0000FF"/>
-          </a:solidFill>
-          <a:ln w="9525">
-            <a:solidFill>
-              <a:srgbClr val="0000FF"/>
-            </a:solidFill>
-            <a:round/>
-            <a:headEnd/>
-            <a:tailEnd/>
-          </a:ln>
-        </p:spPr>
-        <p:txBody>
-          <a:bodyPr/>
-          <a:lstStyle/>
-          <a:p>
-            <a:endParaRPr lang="es-ES"/>
-          </a:p>
-        </p:txBody>
-      </p:sp>
-      <p:sp>
-        <p:nvSpPr>
-          <p:cNvPr id="98" name="AutoShape 36"/>
-          <p:cNvSpPr>
-            <a:spLocks noChangeArrowheads="1"/>
-          </p:cNvSpPr>
-          <p:nvPr/>
-        </p:nvSpPr>
-        <p:spPr bwMode="auto">
-          <a:xfrm rot="12614040" flipV="1">
-            <a:off x="7808105" y="5330628"/>
+          <a:xfrm rot="11003314" flipV="1">
+            <a:off x="6879412" y="5137303"/>
             <a:ext cx="214315" cy="142876"/>
           </a:xfrm>
           <a:prstGeom prst="triangle">
@@ -6155,7 +5876,7 @@
         </p:nvSpPr>
         <p:spPr bwMode="auto">
           <a:xfrm rot="10800000">
-            <a:off x="7643834" y="5143512"/>
+            <a:off x="7143768" y="4929198"/>
             <a:ext cx="142877" cy="145426"/>
           </a:xfrm>
           <a:prstGeom prst="ellipse">
@@ -6168,128 +5889,6 @@
             <a:solidFill>
               <a:srgbClr val="0000FF"/>
             </a:solidFill>
-            <a:round/>
-            <a:headEnd/>
-            <a:tailEnd/>
-          </a:ln>
-        </p:spPr>
-        <p:txBody>
-          <a:bodyPr/>
-          <a:lstStyle/>
-          <a:p>
-            <a:endParaRPr lang="es-ES"/>
-          </a:p>
-        </p:txBody>
-      </p:sp>
-      <p:cxnSp>
-        <p:nvCxnSpPr>
-          <p:cNvPr id="103" name="102 Conector recto"/>
-          <p:cNvCxnSpPr/>
-          <p:nvPr/>
-        </p:nvCxnSpPr>
-        <p:spPr>
-          <a:xfrm>
-            <a:off x="500034" y="5072074"/>
-            <a:ext cx="4643470" cy="1588"/>
-          </a:xfrm>
-          <a:prstGeom prst="line">
-            <a:avLst/>
-          </a:prstGeom>
-        </p:spPr>
-        <p:style>
-          <a:lnRef idx="1">
-            <a:schemeClr val="accent1"/>
-          </a:lnRef>
-          <a:fillRef idx="0">
-            <a:schemeClr val="accent1"/>
-          </a:fillRef>
-          <a:effectRef idx="0">
-            <a:schemeClr val="accent1"/>
-          </a:effectRef>
-          <a:fontRef idx="minor">
-            <a:schemeClr val="tx1"/>
-          </a:fontRef>
-        </p:style>
-      </p:cxnSp>
-      <p:sp>
-        <p:nvSpPr>
-          <p:cNvPr id="106" name="Oval 35"/>
-          <p:cNvSpPr>
-            <a:spLocks noChangeArrowheads="1"/>
-          </p:cNvSpPr>
-          <p:nvPr/>
-        </p:nvSpPr>
-        <p:spPr bwMode="auto">
-          <a:xfrm rot="10800000">
-            <a:off x="7072330" y="5143512"/>
-            <a:ext cx="142877" cy="145426"/>
-          </a:xfrm>
-          <a:prstGeom prst="ellipse">
-            <a:avLst/>
-          </a:prstGeom>
-          <a:noFill/>
-          <a:ln w="9525">
-            <a:solidFill>
-              <a:srgbClr val="0000FF"/>
-            </a:solidFill>
-            <a:prstDash val="sysDash"/>
-            <a:round/>
-            <a:headEnd/>
-            <a:tailEnd/>
-          </a:ln>
-        </p:spPr>
-        <p:txBody>
-          <a:bodyPr/>
-          <a:lstStyle/>
-          <a:p>
-            <a:endParaRPr lang="es-ES" b="1">
-              <a:ln w="12700">
-                <a:solidFill>
-                  <a:schemeClr val="tx2">
-                    <a:satMod val="155000"/>
-                  </a:schemeClr>
-                </a:solidFill>
-                <a:prstDash val="solid"/>
-              </a:ln>
-              <a:solidFill>
-                <a:schemeClr val="bg2">
-                  <a:tint val="85000"/>
-                  <a:satMod val="155000"/>
-                </a:schemeClr>
-              </a:solidFill>
-              <a:effectLst>
-                <a:outerShdw blurRad="41275" dist="20320" dir="1800000" algn="tl" rotWithShape="0">
-                  <a:srgbClr val="000000">
-                    <a:alpha val="40000"/>
-                  </a:srgbClr>
-                </a:outerShdw>
-              </a:effectLst>
-            </a:endParaRPr>
-          </a:p>
-        </p:txBody>
-      </p:sp>
-      <p:sp>
-        <p:nvSpPr>
-          <p:cNvPr id="107" name="Oval 35"/>
-          <p:cNvSpPr>
-            <a:spLocks noChangeArrowheads="1"/>
-          </p:cNvSpPr>
-          <p:nvPr/>
-        </p:nvSpPr>
-        <p:spPr bwMode="auto">
-          <a:xfrm rot="10800000">
-            <a:off x="8001024" y="5500702"/>
-            <a:ext cx="142877" cy="145426"/>
-          </a:xfrm>
-          <a:prstGeom prst="ellipse">
-            <a:avLst/>
-          </a:prstGeom>
-          <a:noFill/>
-          <a:ln w="9525">
-            <a:solidFill>
-              <a:srgbClr val="0000FF"/>
-            </a:solidFill>
-            <a:prstDash val="sysDot"/>
             <a:round/>
             <a:headEnd/>
             <a:tailEnd/>
@@ -6390,42 +5989,180 @@
           </p:txBody>
         </p:sp>
       </p:grpSp>
-      <p:sp>
-        <p:nvSpPr>
-          <p:cNvPr id="111" name="Oval 14"/>
-          <p:cNvSpPr>
-            <a:spLocks noChangeArrowheads="1"/>
-          </p:cNvSpPr>
-          <p:nvPr/>
-        </p:nvSpPr>
-        <p:spPr bwMode="auto">
+      <p:grpSp>
+        <p:nvGrpSpPr>
+          <p:cNvPr id="40" name="39 Grupo"/>
+          <p:cNvGrpSpPr/>
+          <p:nvPr/>
+        </p:nvGrpSpPr>
+        <p:grpSpPr>
           <a:xfrm>
-            <a:off x="8072462" y="4714884"/>
-            <a:ext cx="71438" cy="71438"/>
-          </a:xfrm>
-          <a:prstGeom prst="ellipse">
-            <a:avLst/>
-          </a:prstGeom>
-          <a:solidFill>
-            <a:srgbClr val="000000"/>
-          </a:solidFill>
-          <a:ln w="9360">
+            <a:off x="6858016" y="4283706"/>
+            <a:ext cx="214315" cy="145426"/>
+            <a:chOff x="6858016" y="4214818"/>
+            <a:chExt cx="214315" cy="145426"/>
+          </a:xfrm>
+        </p:grpSpPr>
+        <p:sp>
+          <p:nvSpPr>
+            <p:cNvPr id="77" name="Oval 35"/>
+            <p:cNvSpPr>
+              <a:spLocks noChangeArrowheads="1"/>
+            </p:cNvSpPr>
+            <p:nvPr/>
+          </p:nvSpPr>
+          <p:spPr bwMode="auto">
+            <a:xfrm rot="10800000">
+              <a:off x="6929454" y="4214818"/>
+              <a:ext cx="142877" cy="145426"/>
+            </a:xfrm>
+            <a:prstGeom prst="ellipse">
+              <a:avLst/>
+            </a:prstGeom>
+            <a:solidFill>
+              <a:srgbClr val="0000FF"/>
+            </a:solidFill>
+            <a:ln w="9525">
+              <a:solidFill>
+                <a:srgbClr val="0000FF"/>
+              </a:solidFill>
+              <a:round/>
+              <a:headEnd/>
+              <a:tailEnd/>
+            </a:ln>
+          </p:spPr>
+          <p:txBody>
+            <a:bodyPr/>
+            <a:lstStyle/>
+            <a:p>
+              <a:endParaRPr lang="es-ES"/>
+            </a:p>
+          </p:txBody>
+        </p:sp>
+        <p:sp>
+          <p:nvSpPr>
+            <p:cNvPr id="111" name="Oval 14"/>
+            <p:cNvSpPr>
+              <a:spLocks noChangeArrowheads="1"/>
+            </p:cNvSpPr>
+            <p:nvPr/>
+          </p:nvSpPr>
+          <p:spPr bwMode="auto">
+            <a:xfrm>
+              <a:off x="6858016" y="4286256"/>
+              <a:ext cx="71438" cy="71438"/>
+            </a:xfrm>
+            <a:prstGeom prst="ellipse">
+              <a:avLst/>
+            </a:prstGeom>
             <a:solidFill>
               <a:srgbClr val="000000"/>
             </a:solidFill>
-            <a:miter lim="800000"/>
-            <a:headEnd/>
-            <a:tailEnd/>
-          </a:ln>
-        </p:spPr>
-        <p:txBody>
-          <a:bodyPr wrap="none" anchor="ctr"/>
-          <a:lstStyle/>
-          <a:p>
-            <a:endParaRPr lang="es-ES"/>
-          </a:p>
-        </p:txBody>
-      </p:sp>
+            <a:ln w="9360">
+              <a:solidFill>
+                <a:srgbClr val="000000"/>
+              </a:solidFill>
+              <a:miter lim="800000"/>
+              <a:headEnd/>
+              <a:tailEnd/>
+            </a:ln>
+          </p:spPr>
+          <p:txBody>
+            <a:bodyPr wrap="none" anchor="ctr"/>
+            <a:lstStyle/>
+            <a:p>
+              <a:endParaRPr lang="es-ES"/>
+            </a:p>
+          </p:txBody>
+        </p:sp>
+      </p:grpSp>
+      <p:grpSp>
+        <p:nvGrpSpPr>
+          <p:cNvPr id="42" name="41 Grupo"/>
+          <p:cNvGrpSpPr/>
+          <p:nvPr/>
+        </p:nvGrpSpPr>
+        <p:grpSpPr>
+          <a:xfrm>
+            <a:off x="6858016" y="4069392"/>
+            <a:ext cx="214315" cy="145426"/>
+            <a:chOff x="6858016" y="4214818"/>
+            <a:chExt cx="214315" cy="145426"/>
+          </a:xfrm>
+        </p:grpSpPr>
+        <p:sp>
+          <p:nvSpPr>
+            <p:cNvPr id="43" name="Oval 35"/>
+            <p:cNvSpPr>
+              <a:spLocks noChangeArrowheads="1"/>
+            </p:cNvSpPr>
+            <p:nvPr/>
+          </p:nvSpPr>
+          <p:spPr bwMode="auto">
+            <a:xfrm rot="10800000">
+              <a:off x="6929454" y="4214818"/>
+              <a:ext cx="142877" cy="145426"/>
+            </a:xfrm>
+            <a:prstGeom prst="ellipse">
+              <a:avLst/>
+            </a:prstGeom>
+            <a:solidFill>
+              <a:srgbClr val="0000FF"/>
+            </a:solidFill>
+            <a:ln w="9525">
+              <a:solidFill>
+                <a:srgbClr val="0000FF"/>
+              </a:solidFill>
+              <a:round/>
+              <a:headEnd/>
+              <a:tailEnd/>
+            </a:ln>
+          </p:spPr>
+          <p:txBody>
+            <a:bodyPr/>
+            <a:lstStyle/>
+            <a:p>
+              <a:endParaRPr lang="es-ES"/>
+            </a:p>
+          </p:txBody>
+        </p:sp>
+        <p:sp>
+          <p:nvSpPr>
+            <p:cNvPr id="44" name="Oval 14"/>
+            <p:cNvSpPr>
+              <a:spLocks noChangeArrowheads="1"/>
+            </p:cNvSpPr>
+            <p:nvPr/>
+          </p:nvSpPr>
+          <p:spPr bwMode="auto">
+            <a:xfrm>
+              <a:off x="6858016" y="4286256"/>
+              <a:ext cx="71438" cy="71438"/>
+            </a:xfrm>
+            <a:prstGeom prst="ellipse">
+              <a:avLst/>
+            </a:prstGeom>
+            <a:solidFill>
+              <a:srgbClr val="000000"/>
+            </a:solidFill>
+            <a:ln w="9360">
+              <a:solidFill>
+                <a:srgbClr val="000000"/>
+              </a:solidFill>
+              <a:miter lim="800000"/>
+              <a:headEnd/>
+              <a:tailEnd/>
+            </a:ln>
+          </p:spPr>
+          <p:txBody>
+            <a:bodyPr wrap="none" anchor="ctr"/>
+            <a:lstStyle/>
+            <a:p>
+              <a:endParaRPr lang="es-ES"/>
+            </a:p>
+          </p:txBody>
+        </p:sp>
+      </p:grpSp>
     </p:spTree>
   </p:cSld>
   <p:clrMapOvr>
@@ -6458,50 +6195,6 @@
           <a:chExt cx="0" cy="0"/>
         </a:xfrm>
       </p:grpSpPr>
-      <p:sp>
-        <p:nvSpPr>
-          <p:cNvPr id="3" name="2 Título"/>
-          <p:cNvSpPr>
-            <a:spLocks noGrp="1"/>
-          </p:cNvSpPr>
-          <p:nvPr>
-            <p:ph type="title"/>
-          </p:nvPr>
-        </p:nvSpPr>
-        <p:spPr>
-          <a:xfrm>
-            <a:off x="500034" y="785794"/>
-            <a:ext cx="8229600" cy="428628"/>
-          </a:xfrm>
-        </p:spPr>
-        <p:style>
-          <a:lnRef idx="1">
-            <a:schemeClr val="accent2"/>
-          </a:lnRef>
-          <a:fillRef idx="3">
-            <a:schemeClr val="accent2"/>
-          </a:fillRef>
-          <a:effectRef idx="2">
-            <a:schemeClr val="accent2"/>
-          </a:effectRef>
-          <a:fontRef idx="minor">
-            <a:schemeClr val="lt1"/>
-          </a:fontRef>
-        </p:style>
-        <p:txBody>
-          <a:bodyPr>
-            <a:noAutofit/>
-          </a:bodyPr>
-          <a:lstStyle/>
-          <a:p>
-            <a:r>
-              <a:rPr lang="es-ES" sz="2800" dirty="0" smtClean="0"/>
-              <a:t>Trabajo de los 2º defensores</a:t>
-            </a:r>
-            <a:endParaRPr lang="es-ES" sz="2800" dirty="0"/>
-          </a:p>
-        </p:txBody>
-      </p:sp>
       <p:graphicFrame>
         <p:nvGraphicFramePr>
           <p:cNvPr id="5" name="4 Tabla"/>
@@ -6563,8 +6256,43 @@
                           </a:effectLst>
                           <a:latin typeface="Tahoma" pitchFamily="34" charset="0"/>
                         </a:rPr>
-                        <a:t>Trabajo de 3x3</a:t>
+                        <a:t>Trabajo de </a:t>
                       </a:r>
+                      <a:r>
+                        <a:rPr kumimoji="0" lang="es-ES" sz="1600" b="1" i="1" u="sng" strike="noStrike" cap="none" normalizeH="0" baseline="0" dirty="0" smtClean="0">
+                          <a:ln>
+                            <a:noFill/>
+                          </a:ln>
+                          <a:solidFill>
+                            <a:schemeClr val="tx1"/>
+                          </a:solidFill>
+                          <a:effectLst>
+                            <a:outerShdw blurRad="38100" dist="38100" dir="2700000" algn="tl">
+                              <a:srgbClr val="000000">
+                                <a:alpha val="43137"/>
+                              </a:srgbClr>
+                            </a:outerShdw>
+                          </a:effectLst>
+                          <a:latin typeface="Tahoma" pitchFamily="34" charset="0"/>
+                        </a:rPr>
+                        <a:t>4x4</a:t>
+                      </a:r>
+                      <a:endParaRPr kumimoji="0" lang="es-ES" sz="1600" b="1" i="1" u="sng" strike="noStrike" cap="none" normalizeH="0" baseline="0" dirty="0" smtClean="0">
+                        <a:ln>
+                          <a:noFill/>
+                        </a:ln>
+                        <a:solidFill>
+                          <a:schemeClr val="tx1"/>
+                        </a:solidFill>
+                        <a:effectLst>
+                          <a:outerShdw blurRad="38100" dist="38100" dir="2700000" algn="tl">
+                            <a:srgbClr val="000000">
+                              <a:alpha val="43137"/>
+                            </a:srgbClr>
+                          </a:outerShdw>
+                        </a:effectLst>
+                        <a:latin typeface="Tahoma" pitchFamily="34" charset="0"/>
+                      </a:endParaRPr>
                     </a:p>
                   </a:txBody>
                   <a:tcPr horzOverflow="overflow"/>
@@ -6626,15 +6354,14 @@
                         <a:buFontTx/>
                         <a:buNone/>
                         <a:tabLst/>
-                        <a:defRPr/>
                       </a:pPr>
                       <a:r>
-                        <a:rPr kumimoji="0" lang="es-ES" sz="1600" b="1" i="1" u="sng" strike="noStrike" kern="1200" cap="none" spc="0" normalizeH="0" baseline="0" noProof="0" dirty="0" smtClean="0">
+                        <a:rPr kumimoji="0" lang="es-ES" sz="1600" b="1" i="1" u="sng" strike="noStrike" cap="none" normalizeH="0" baseline="0" smtClean="0">
                           <a:ln>
                             <a:noFill/>
                           </a:ln>
                           <a:solidFill>
-                            <a:prstClr val="black"/>
+                            <a:schemeClr val="tx1"/>
                           </a:solidFill>
                           <a:effectLst>
                             <a:outerShdw blurRad="38100" dist="38100" dir="2700000" algn="tl">
@@ -6643,20 +6370,16 @@
                               </a:srgbClr>
                             </a:outerShdw>
                           </a:effectLst>
-                          <a:uLnTx/>
-                          <a:uFillTx/>
                           <a:latin typeface="Tahoma" pitchFamily="34" charset="0"/>
-                          <a:ea typeface="+mn-ea"/>
-                          <a:cs typeface="+mn-cs"/>
                         </a:rPr>
-                        <a:t>Trabajo de 3x3 </a:t>
+                        <a:t>Trabajo de 4x4</a:t>
                       </a:r>
-                      <a:endParaRPr kumimoji="0" lang="es-ES" sz="1600" b="1" i="1" u="none" strike="noStrike" kern="1200" cap="none" spc="0" normalizeH="0" baseline="0" noProof="0" dirty="0" smtClean="0">
+                      <a:endParaRPr kumimoji="0" lang="es-ES" sz="1600" b="1" i="1" u="sng" strike="noStrike" cap="none" normalizeH="0" baseline="0" dirty="0" smtClean="0">
                         <a:ln>
                           <a:noFill/>
                         </a:ln>
                         <a:solidFill>
-                          <a:prstClr val="black"/>
+                          <a:schemeClr val="tx1"/>
                         </a:solidFill>
                         <a:effectLst>
                           <a:outerShdw blurRad="38100" dist="38100" dir="2700000" algn="tl">
@@ -6665,11 +6388,7 @@
                             </a:srgbClr>
                           </a:outerShdw>
                         </a:effectLst>
-                        <a:uLnTx/>
-                        <a:uFillTx/>
                         <a:latin typeface="Tahoma" pitchFamily="34" charset="0"/>
-                        <a:ea typeface="+mn-ea"/>
-                        <a:cs typeface="+mn-cs"/>
                       </a:endParaRPr>
                     </a:p>
                   </a:txBody>
@@ -6717,533 +6436,721 @@
       </p:graphicFrame>
       <p:grpSp>
         <p:nvGrpSpPr>
-          <p:cNvPr id="94" name="93 Grupo"/>
+          <p:cNvPr id="44" name="Group 26"/>
+          <p:cNvGrpSpPr>
+            <a:grpSpLocks/>
+          </p:cNvGrpSpPr>
+          <p:nvPr/>
+        </p:nvGrpSpPr>
+        <p:grpSpPr bwMode="auto">
+          <a:xfrm rot="10800000">
+            <a:off x="5500694" y="1571613"/>
+            <a:ext cx="3071834" cy="2214578"/>
+            <a:chOff x="1846" y="2556"/>
+            <a:chExt cx="7952" cy="5822"/>
+          </a:xfrm>
+        </p:grpSpPr>
+        <p:sp>
+          <p:nvSpPr>
+            <p:cNvPr id="45" name="Rectangle 27"/>
+            <p:cNvSpPr>
+              <a:spLocks noChangeArrowheads="1"/>
+            </p:cNvSpPr>
+            <p:nvPr/>
+          </p:nvSpPr>
+          <p:spPr bwMode="auto">
+            <a:xfrm>
+              <a:off x="1846" y="2645"/>
+              <a:ext cx="7952" cy="5733"/>
+            </a:xfrm>
+            <a:prstGeom prst="rect">
+              <a:avLst/>
+            </a:prstGeom>
+            <a:solidFill>
+              <a:srgbClr val="FFFFFF"/>
+            </a:solidFill>
+            <a:ln w="25400">
+              <a:solidFill>
+                <a:srgbClr val="000000"/>
+              </a:solidFill>
+              <a:miter lim="800000"/>
+              <a:headEnd/>
+              <a:tailEnd/>
+            </a:ln>
+          </p:spPr>
+          <p:txBody>
+            <a:bodyPr/>
+            <a:lstStyle/>
+            <a:p>
+              <a:endParaRPr lang="es-ES"/>
+            </a:p>
+          </p:txBody>
+        </p:sp>
+        <p:sp>
+          <p:nvSpPr>
+            <p:cNvPr id="46" name="Arc 28"/>
+            <p:cNvSpPr>
+              <a:spLocks/>
+            </p:cNvSpPr>
+            <p:nvPr/>
+          </p:nvSpPr>
+          <p:spPr bwMode="auto">
+            <a:xfrm flipH="1" flipV="1">
+              <a:off x="2889" y="2645"/>
+              <a:ext cx="2346" cy="2293"/>
+            </a:xfrm>
+            <a:custGeom>
+              <a:avLst/>
+              <a:gdLst>
+                <a:gd name="T0" fmla="*/ 0 w 21600"/>
+                <a:gd name="T1" fmla="*/ 0 h 21600"/>
+                <a:gd name="T2" fmla="*/ 255 w 21600"/>
+                <a:gd name="T3" fmla="*/ 243 h 21600"/>
+                <a:gd name="T4" fmla="*/ 0 w 21600"/>
+                <a:gd name="T5" fmla="*/ 243 h 21600"/>
+                <a:gd name="T6" fmla="*/ 0 60000 65536"/>
+                <a:gd name="T7" fmla="*/ 0 60000 65536"/>
+                <a:gd name="T8" fmla="*/ 0 60000 65536"/>
+                <a:gd name="T9" fmla="*/ 0 w 21600"/>
+                <a:gd name="T10" fmla="*/ 0 h 21600"/>
+                <a:gd name="T11" fmla="*/ 21600 w 21600"/>
+                <a:gd name="T12" fmla="*/ 21600 h 21600"/>
+              </a:gdLst>
+              <a:ahLst/>
+              <a:cxnLst>
+                <a:cxn ang="T6">
+                  <a:pos x="T0" y="T1"/>
+                </a:cxn>
+                <a:cxn ang="T7">
+                  <a:pos x="T2" y="T3"/>
+                </a:cxn>
+                <a:cxn ang="T8">
+                  <a:pos x="T4" y="T5"/>
+                </a:cxn>
+              </a:cxnLst>
+              <a:rect l="T9" t="T10" r="T11" b="T12"/>
+              <a:pathLst>
+                <a:path w="21600" h="21600" fill="none" extrusionOk="0">
+                  <a:moveTo>
+                    <a:pt x="-1" y="0"/>
+                  </a:moveTo>
+                  <a:cubicBezTo>
+                    <a:pt x="11929" y="0"/>
+                    <a:pt x="21600" y="9670"/>
+                    <a:pt x="21600" y="21600"/>
+                  </a:cubicBezTo>
+                </a:path>
+                <a:path w="21600" h="21600" stroke="0" extrusionOk="0">
+                  <a:moveTo>
+                    <a:pt x="-1" y="0"/>
+                  </a:moveTo>
+                  <a:cubicBezTo>
+                    <a:pt x="11929" y="0"/>
+                    <a:pt x="21600" y="9670"/>
+                    <a:pt x="21600" y="21600"/>
+                  </a:cubicBezTo>
+                  <a:lnTo>
+                    <a:pt x="0" y="21600"/>
+                  </a:lnTo>
+                  <a:close/>
+                </a:path>
+              </a:pathLst>
+            </a:custGeom>
+            <a:noFill/>
+            <a:ln w="19050">
+              <a:solidFill>
+                <a:srgbClr val="000000"/>
+              </a:solidFill>
+              <a:round/>
+              <a:headEnd/>
+              <a:tailEnd/>
+            </a:ln>
+          </p:spPr>
+          <p:txBody>
+            <a:bodyPr/>
+            <a:lstStyle/>
+            <a:p>
+              <a:endParaRPr lang="es-ES"/>
+            </a:p>
+          </p:txBody>
+        </p:sp>
+        <p:sp>
+          <p:nvSpPr>
+            <p:cNvPr id="47" name="Line 29"/>
+            <p:cNvSpPr>
+              <a:spLocks noChangeShapeType="1"/>
+            </p:cNvSpPr>
+            <p:nvPr/>
+          </p:nvSpPr>
+          <p:spPr bwMode="auto">
+            <a:xfrm>
+              <a:off x="5235" y="4938"/>
+              <a:ext cx="1174" cy="0"/>
+            </a:xfrm>
+            <a:prstGeom prst="line">
+              <a:avLst/>
+            </a:prstGeom>
+            <a:noFill/>
+            <a:ln w="19050">
+              <a:solidFill>
+                <a:srgbClr val="000000"/>
+              </a:solidFill>
+              <a:round/>
+              <a:headEnd/>
+              <a:tailEnd/>
+            </a:ln>
+          </p:spPr>
+          <p:txBody>
+            <a:bodyPr/>
+            <a:lstStyle/>
+            <a:p>
+              <a:endParaRPr lang="es-ES"/>
+            </a:p>
+          </p:txBody>
+        </p:sp>
+        <p:sp>
+          <p:nvSpPr>
+            <p:cNvPr id="48" name="Rectangle 30"/>
+            <p:cNvSpPr>
+              <a:spLocks noChangeArrowheads="1"/>
+            </p:cNvSpPr>
+            <p:nvPr/>
+          </p:nvSpPr>
+          <p:spPr bwMode="auto">
+            <a:xfrm>
+              <a:off x="5235" y="2556"/>
+              <a:ext cx="1174" cy="156"/>
+            </a:xfrm>
+            <a:prstGeom prst="rect">
+              <a:avLst/>
+            </a:prstGeom>
+            <a:solidFill>
+              <a:srgbClr val="000000"/>
+            </a:solidFill>
+            <a:ln w="9525">
+              <a:solidFill>
+                <a:srgbClr val="000000"/>
+              </a:solidFill>
+              <a:miter lim="800000"/>
+              <a:headEnd/>
+              <a:tailEnd/>
+            </a:ln>
+          </p:spPr>
+          <p:txBody>
+            <a:bodyPr/>
+            <a:lstStyle/>
+            <a:p>
+              <a:endParaRPr lang="es-ES"/>
+            </a:p>
+          </p:txBody>
+        </p:sp>
+        <p:sp>
+          <p:nvSpPr>
+            <p:cNvPr id="49" name="Arc 31"/>
+            <p:cNvSpPr>
+              <a:spLocks/>
+            </p:cNvSpPr>
+            <p:nvPr/>
+          </p:nvSpPr>
+          <p:spPr bwMode="auto">
+            <a:xfrm flipV="1">
+              <a:off x="6409" y="2645"/>
+              <a:ext cx="2346" cy="2293"/>
+            </a:xfrm>
+            <a:custGeom>
+              <a:avLst/>
+              <a:gdLst>
+                <a:gd name="T0" fmla="*/ 0 w 21600"/>
+                <a:gd name="T1" fmla="*/ 0 h 21600"/>
+                <a:gd name="T2" fmla="*/ 255 w 21600"/>
+                <a:gd name="T3" fmla="*/ 243 h 21600"/>
+                <a:gd name="T4" fmla="*/ 0 w 21600"/>
+                <a:gd name="T5" fmla="*/ 243 h 21600"/>
+                <a:gd name="T6" fmla="*/ 0 60000 65536"/>
+                <a:gd name="T7" fmla="*/ 0 60000 65536"/>
+                <a:gd name="T8" fmla="*/ 0 60000 65536"/>
+                <a:gd name="T9" fmla="*/ 0 w 21600"/>
+                <a:gd name="T10" fmla="*/ 0 h 21600"/>
+                <a:gd name="T11" fmla="*/ 21600 w 21600"/>
+                <a:gd name="T12" fmla="*/ 21600 h 21600"/>
+              </a:gdLst>
+              <a:ahLst/>
+              <a:cxnLst>
+                <a:cxn ang="T6">
+                  <a:pos x="T0" y="T1"/>
+                </a:cxn>
+                <a:cxn ang="T7">
+                  <a:pos x="T2" y="T3"/>
+                </a:cxn>
+                <a:cxn ang="T8">
+                  <a:pos x="T4" y="T5"/>
+                </a:cxn>
+              </a:cxnLst>
+              <a:rect l="T9" t="T10" r="T11" b="T12"/>
+              <a:pathLst>
+                <a:path w="21600" h="21600" fill="none" extrusionOk="0">
+                  <a:moveTo>
+                    <a:pt x="-1" y="0"/>
+                  </a:moveTo>
+                  <a:cubicBezTo>
+                    <a:pt x="11929" y="0"/>
+                    <a:pt x="21600" y="9670"/>
+                    <a:pt x="21600" y="21600"/>
+                  </a:cubicBezTo>
+                </a:path>
+                <a:path w="21600" h="21600" stroke="0" extrusionOk="0">
+                  <a:moveTo>
+                    <a:pt x="-1" y="0"/>
+                  </a:moveTo>
+                  <a:cubicBezTo>
+                    <a:pt x="11929" y="0"/>
+                    <a:pt x="21600" y="9670"/>
+                    <a:pt x="21600" y="21600"/>
+                  </a:cubicBezTo>
+                  <a:lnTo>
+                    <a:pt x="0" y="21600"/>
+                  </a:lnTo>
+                  <a:close/>
+                </a:path>
+              </a:pathLst>
+            </a:custGeom>
+            <a:noFill/>
+            <a:ln w="19050">
+              <a:solidFill>
+                <a:srgbClr val="000000"/>
+              </a:solidFill>
+              <a:round/>
+              <a:headEnd/>
+              <a:tailEnd/>
+            </a:ln>
+          </p:spPr>
+          <p:txBody>
+            <a:bodyPr/>
+            <a:lstStyle/>
+            <a:p>
+              <a:endParaRPr lang="es-ES"/>
+            </a:p>
+          </p:txBody>
+        </p:sp>
+        <p:sp>
+          <p:nvSpPr>
+            <p:cNvPr id="50" name="Arc 32"/>
+            <p:cNvSpPr>
+              <a:spLocks/>
+            </p:cNvSpPr>
+            <p:nvPr/>
+          </p:nvSpPr>
+          <p:spPr bwMode="auto">
+            <a:xfrm flipH="1" flipV="1">
+              <a:off x="1846" y="3792"/>
+              <a:ext cx="3389" cy="2293"/>
+            </a:xfrm>
+            <a:custGeom>
+              <a:avLst/>
+              <a:gdLst>
+                <a:gd name="T0" fmla="*/ 0 w 21600"/>
+                <a:gd name="T1" fmla="*/ 0 h 21600"/>
+                <a:gd name="T2" fmla="*/ 532 w 21600"/>
+                <a:gd name="T3" fmla="*/ 243 h 21600"/>
+                <a:gd name="T4" fmla="*/ 0 w 21600"/>
+                <a:gd name="T5" fmla="*/ 243 h 21600"/>
+                <a:gd name="T6" fmla="*/ 0 60000 65536"/>
+                <a:gd name="T7" fmla="*/ 0 60000 65536"/>
+                <a:gd name="T8" fmla="*/ 0 60000 65536"/>
+                <a:gd name="T9" fmla="*/ 0 w 21600"/>
+                <a:gd name="T10" fmla="*/ 0 h 21600"/>
+                <a:gd name="T11" fmla="*/ 21600 w 21600"/>
+                <a:gd name="T12" fmla="*/ 21600 h 21600"/>
+              </a:gdLst>
+              <a:ahLst/>
+              <a:cxnLst>
+                <a:cxn ang="T6">
+                  <a:pos x="T0" y="T1"/>
+                </a:cxn>
+                <a:cxn ang="T7">
+                  <a:pos x="T2" y="T3"/>
+                </a:cxn>
+                <a:cxn ang="T8">
+                  <a:pos x="T4" y="T5"/>
+                </a:cxn>
+              </a:cxnLst>
+              <a:rect l="T9" t="T10" r="T11" b="T12"/>
+              <a:pathLst>
+                <a:path w="21600" h="21600" fill="none" extrusionOk="0">
+                  <a:moveTo>
+                    <a:pt x="-1" y="0"/>
+                  </a:moveTo>
+                  <a:cubicBezTo>
+                    <a:pt x="11929" y="0"/>
+                    <a:pt x="21600" y="9670"/>
+                    <a:pt x="21600" y="21600"/>
+                  </a:cubicBezTo>
+                </a:path>
+                <a:path w="21600" h="21600" stroke="0" extrusionOk="0">
+                  <a:moveTo>
+                    <a:pt x="-1" y="0"/>
+                  </a:moveTo>
+                  <a:cubicBezTo>
+                    <a:pt x="11929" y="0"/>
+                    <a:pt x="21600" y="9670"/>
+                    <a:pt x="21600" y="21600"/>
+                  </a:cubicBezTo>
+                  <a:lnTo>
+                    <a:pt x="0" y="21600"/>
+                  </a:lnTo>
+                  <a:close/>
+                </a:path>
+              </a:pathLst>
+            </a:custGeom>
+            <a:noFill/>
+            <a:ln w="19050">
+              <a:solidFill>
+                <a:srgbClr val="000000"/>
+              </a:solidFill>
+              <a:prstDash val="dash"/>
+              <a:round/>
+              <a:headEnd/>
+              <a:tailEnd/>
+            </a:ln>
+          </p:spPr>
+          <p:txBody>
+            <a:bodyPr/>
+            <a:lstStyle/>
+            <a:p>
+              <a:endParaRPr lang="es-ES"/>
+            </a:p>
+          </p:txBody>
+        </p:sp>
+        <p:sp>
+          <p:nvSpPr>
+            <p:cNvPr id="51" name="Arc 33"/>
+            <p:cNvSpPr>
+              <a:spLocks/>
+            </p:cNvSpPr>
+            <p:nvPr/>
+          </p:nvSpPr>
+          <p:spPr bwMode="auto">
+            <a:xfrm flipV="1">
+              <a:off x="6409" y="3792"/>
+              <a:ext cx="3389" cy="2293"/>
+            </a:xfrm>
+            <a:custGeom>
+              <a:avLst/>
+              <a:gdLst>
+                <a:gd name="T0" fmla="*/ 0 w 21600"/>
+                <a:gd name="T1" fmla="*/ 0 h 21600"/>
+                <a:gd name="T2" fmla="*/ 532 w 21600"/>
+                <a:gd name="T3" fmla="*/ 243 h 21600"/>
+                <a:gd name="T4" fmla="*/ 0 w 21600"/>
+                <a:gd name="T5" fmla="*/ 243 h 21600"/>
+                <a:gd name="T6" fmla="*/ 0 60000 65536"/>
+                <a:gd name="T7" fmla="*/ 0 60000 65536"/>
+                <a:gd name="T8" fmla="*/ 0 60000 65536"/>
+                <a:gd name="T9" fmla="*/ 0 w 21600"/>
+                <a:gd name="T10" fmla="*/ 0 h 21600"/>
+                <a:gd name="T11" fmla="*/ 21600 w 21600"/>
+                <a:gd name="T12" fmla="*/ 21600 h 21600"/>
+              </a:gdLst>
+              <a:ahLst/>
+              <a:cxnLst>
+                <a:cxn ang="T6">
+                  <a:pos x="T0" y="T1"/>
+                </a:cxn>
+                <a:cxn ang="T7">
+                  <a:pos x="T2" y="T3"/>
+                </a:cxn>
+                <a:cxn ang="T8">
+                  <a:pos x="T4" y="T5"/>
+                </a:cxn>
+              </a:cxnLst>
+              <a:rect l="T9" t="T10" r="T11" b="T12"/>
+              <a:pathLst>
+                <a:path w="21600" h="21600" fill="none" extrusionOk="0">
+                  <a:moveTo>
+                    <a:pt x="-1" y="0"/>
+                  </a:moveTo>
+                  <a:cubicBezTo>
+                    <a:pt x="11929" y="0"/>
+                    <a:pt x="21600" y="9670"/>
+                    <a:pt x="21600" y="21600"/>
+                  </a:cubicBezTo>
+                </a:path>
+                <a:path w="21600" h="21600" stroke="0" extrusionOk="0">
+                  <a:moveTo>
+                    <a:pt x="-1" y="0"/>
+                  </a:moveTo>
+                  <a:cubicBezTo>
+                    <a:pt x="11929" y="0"/>
+                    <a:pt x="21600" y="9670"/>
+                    <a:pt x="21600" y="21600"/>
+                  </a:cubicBezTo>
+                  <a:lnTo>
+                    <a:pt x="0" y="21600"/>
+                  </a:lnTo>
+                  <a:close/>
+                </a:path>
+              </a:pathLst>
+            </a:custGeom>
+            <a:noFill/>
+            <a:ln w="19050">
+              <a:solidFill>
+                <a:srgbClr val="000000"/>
+              </a:solidFill>
+              <a:prstDash val="dash"/>
+              <a:round/>
+              <a:headEnd/>
+              <a:tailEnd/>
+            </a:ln>
+          </p:spPr>
+          <p:txBody>
+            <a:bodyPr/>
+            <a:lstStyle/>
+            <a:p>
+              <a:endParaRPr lang="es-ES"/>
+            </a:p>
+          </p:txBody>
+        </p:sp>
+        <p:sp>
+          <p:nvSpPr>
+            <p:cNvPr id="52" name="Line 34"/>
+            <p:cNvSpPr>
+              <a:spLocks noChangeShapeType="1"/>
+            </p:cNvSpPr>
+            <p:nvPr/>
+          </p:nvSpPr>
+          <p:spPr bwMode="auto">
+            <a:xfrm>
+              <a:off x="5235" y="6085"/>
+              <a:ext cx="1174" cy="0"/>
+            </a:xfrm>
+            <a:prstGeom prst="line">
+              <a:avLst/>
+            </a:prstGeom>
+            <a:noFill/>
+            <a:ln w="19050">
+              <a:solidFill>
+                <a:srgbClr val="000000"/>
+              </a:solidFill>
+              <a:prstDash val="dash"/>
+              <a:round/>
+              <a:headEnd/>
+              <a:tailEnd/>
+            </a:ln>
+          </p:spPr>
+          <p:txBody>
+            <a:bodyPr/>
+            <a:lstStyle/>
+            <a:p>
+              <a:endParaRPr lang="es-ES"/>
+            </a:p>
+          </p:txBody>
+        </p:sp>
+      </p:grpSp>
+      <p:sp>
+        <p:nvSpPr>
+          <p:cNvPr id="53" name="AutoShape 36"/>
+          <p:cNvSpPr>
+            <a:spLocks noChangeArrowheads="1"/>
+          </p:cNvSpPr>
+          <p:nvPr/>
+        </p:nvSpPr>
+        <p:spPr bwMode="auto">
+          <a:xfrm rot="10800000" flipV="1">
+            <a:off x="6879411" y="2152786"/>
+            <a:ext cx="214315" cy="142876"/>
+          </a:xfrm>
+          <a:prstGeom prst="triangle">
+            <a:avLst>
+              <a:gd name="adj" fmla="val 50000"/>
+            </a:avLst>
+          </a:prstGeom>
+          <a:solidFill>
+            <a:srgbClr val="FF0000"/>
+          </a:solidFill>
+          <a:ln w="9525">
+            <a:solidFill>
+              <a:srgbClr val="FF0000"/>
+            </a:solidFill>
+            <a:miter lim="800000"/>
+            <a:headEnd/>
+            <a:tailEnd/>
+          </a:ln>
+        </p:spPr>
+        <p:txBody>
+          <a:bodyPr/>
+          <a:lstStyle/>
+          <a:p>
+            <a:endParaRPr lang="es-ES"/>
+          </a:p>
+        </p:txBody>
+      </p:sp>
+      <p:sp>
+        <p:nvSpPr>
+          <p:cNvPr id="54" name="AutoShape 51"/>
+          <p:cNvSpPr>
+            <a:spLocks noChangeArrowheads="1"/>
+          </p:cNvSpPr>
+          <p:nvPr/>
+        </p:nvSpPr>
+        <p:spPr bwMode="auto">
+          <a:xfrm rot="10800000" flipV="1">
+            <a:off x="6000760" y="3180290"/>
+            <a:ext cx="37236" cy="105834"/>
+          </a:xfrm>
+          <a:prstGeom prst="triangle">
+            <a:avLst>
+              <a:gd name="adj" fmla="val 50000"/>
+            </a:avLst>
+          </a:prstGeom>
+          <a:solidFill>
+            <a:srgbClr val="008000"/>
+          </a:solidFill>
+          <a:ln w="9525">
+            <a:solidFill>
+              <a:srgbClr val="008000"/>
+            </a:solidFill>
+            <a:miter lim="800000"/>
+            <a:headEnd/>
+            <a:tailEnd/>
+          </a:ln>
+        </p:spPr>
+        <p:txBody>
+          <a:bodyPr/>
+          <a:lstStyle/>
+          <a:p>
+            <a:endParaRPr lang="es-ES"/>
+          </a:p>
+        </p:txBody>
+      </p:sp>
+      <p:sp>
+        <p:nvSpPr>
+          <p:cNvPr id="59" name="AutoShape 51"/>
+          <p:cNvSpPr>
+            <a:spLocks noChangeArrowheads="1"/>
+          </p:cNvSpPr>
+          <p:nvPr/>
+        </p:nvSpPr>
+        <p:spPr bwMode="auto">
+          <a:xfrm rot="10800000" flipV="1">
+            <a:off x="8035226" y="3180290"/>
+            <a:ext cx="37236" cy="105834"/>
+          </a:xfrm>
+          <a:prstGeom prst="triangle">
+            <a:avLst>
+              <a:gd name="adj" fmla="val 50000"/>
+            </a:avLst>
+          </a:prstGeom>
+          <a:solidFill>
+            <a:srgbClr val="008000"/>
+          </a:solidFill>
+          <a:ln w="9525">
+            <a:solidFill>
+              <a:srgbClr val="008000"/>
+            </a:solidFill>
+            <a:miter lim="800000"/>
+            <a:headEnd/>
+            <a:tailEnd/>
+          </a:ln>
+        </p:spPr>
+        <p:txBody>
+          <a:bodyPr/>
+          <a:lstStyle/>
+          <a:p>
+            <a:endParaRPr lang="es-ES"/>
+          </a:p>
+        </p:txBody>
+      </p:sp>
+      <p:sp>
+        <p:nvSpPr>
+          <p:cNvPr id="62" name="AutoShape 36"/>
+          <p:cNvSpPr>
+            <a:spLocks noChangeArrowheads="1"/>
+          </p:cNvSpPr>
+          <p:nvPr/>
+        </p:nvSpPr>
+        <p:spPr bwMode="auto">
+          <a:xfrm rot="11003314" flipV="1">
+            <a:off x="6879412" y="2708413"/>
+            <a:ext cx="214315" cy="142876"/>
+          </a:xfrm>
+          <a:prstGeom prst="triangle">
+            <a:avLst>
+              <a:gd name="adj" fmla="val 50000"/>
+            </a:avLst>
+          </a:prstGeom>
+          <a:solidFill>
+            <a:srgbClr val="FF0000"/>
+          </a:solidFill>
+          <a:ln w="9525">
+            <a:solidFill>
+              <a:srgbClr val="FF0000"/>
+            </a:solidFill>
+            <a:miter lim="800000"/>
+            <a:headEnd/>
+            <a:tailEnd/>
+          </a:ln>
+        </p:spPr>
+        <p:txBody>
+          <a:bodyPr/>
+          <a:lstStyle/>
+          <a:p>
+            <a:endParaRPr lang="es-ES"/>
+          </a:p>
+        </p:txBody>
+      </p:sp>
+      <p:sp>
+        <p:nvSpPr>
+          <p:cNvPr id="63" name="Oval 35"/>
+          <p:cNvSpPr>
+            <a:spLocks noChangeArrowheads="1"/>
+          </p:cNvSpPr>
+          <p:nvPr/>
+        </p:nvSpPr>
+        <p:spPr bwMode="auto">
+          <a:xfrm rot="10800000">
+            <a:off x="7143768" y="2643182"/>
+            <a:ext cx="142877" cy="145426"/>
+          </a:xfrm>
+          <a:prstGeom prst="ellipse">
+            <a:avLst/>
+          </a:prstGeom>
+          <a:solidFill>
+            <a:srgbClr val="0000FF"/>
+          </a:solidFill>
+          <a:ln w="9525">
+            <a:solidFill>
+              <a:srgbClr val="0000FF"/>
+            </a:solidFill>
+            <a:round/>
+            <a:headEnd/>
+            <a:tailEnd/>
+          </a:ln>
+        </p:spPr>
+        <p:txBody>
+          <a:bodyPr/>
+          <a:lstStyle/>
+          <a:p>
+            <a:endParaRPr lang="es-ES"/>
+          </a:p>
+        </p:txBody>
+      </p:sp>
+      <p:grpSp>
+        <p:nvGrpSpPr>
+          <p:cNvPr id="64" name="63 Grupo"/>
           <p:cNvGrpSpPr/>
           <p:nvPr/>
         </p:nvGrpSpPr>
         <p:grpSpPr>
           <a:xfrm>
-            <a:off x="5429256" y="1571612"/>
-            <a:ext cx="3071834" cy="2214578"/>
-            <a:chOff x="5429256" y="1571612"/>
-            <a:chExt cx="3071834" cy="2214578"/>
+            <a:off x="6858016" y="1854816"/>
+            <a:ext cx="214315" cy="145426"/>
+            <a:chOff x="6858016" y="4214818"/>
+            <a:chExt cx="214315" cy="145426"/>
           </a:xfrm>
         </p:grpSpPr>
-        <p:grpSp>
-          <p:nvGrpSpPr>
-            <p:cNvPr id="55" name="Group 26"/>
-            <p:cNvGrpSpPr>
-              <a:grpSpLocks/>
-            </p:cNvGrpSpPr>
-            <p:nvPr/>
-          </p:nvGrpSpPr>
-          <p:grpSpPr bwMode="auto">
-            <a:xfrm rot="10800000">
-              <a:off x="5429256" y="1571612"/>
-              <a:ext cx="3071834" cy="2214578"/>
-              <a:chOff x="1846" y="2556"/>
-              <a:chExt cx="7952" cy="5822"/>
-            </a:xfrm>
-          </p:grpSpPr>
-          <p:sp>
-            <p:nvSpPr>
-              <p:cNvPr id="84" name="Rectangle 27"/>
-              <p:cNvSpPr>
-                <a:spLocks noChangeArrowheads="1"/>
-              </p:cNvSpPr>
-              <p:nvPr/>
-            </p:nvSpPr>
-            <p:spPr bwMode="auto">
-              <a:xfrm>
-                <a:off x="1846" y="2645"/>
-                <a:ext cx="7952" cy="5733"/>
-              </a:xfrm>
-              <a:prstGeom prst="rect">
-                <a:avLst/>
-              </a:prstGeom>
-              <a:solidFill>
-                <a:srgbClr val="FFFFFF"/>
-              </a:solidFill>
-              <a:ln w="25400">
-                <a:solidFill>
-                  <a:srgbClr val="000000"/>
-                </a:solidFill>
-                <a:miter lim="800000"/>
-                <a:headEnd/>
-                <a:tailEnd/>
-              </a:ln>
-            </p:spPr>
-            <p:txBody>
-              <a:bodyPr/>
-              <a:lstStyle/>
-              <a:p>
-                <a:endParaRPr lang="es-ES"/>
-              </a:p>
-            </p:txBody>
-          </p:sp>
-          <p:sp>
-            <p:nvSpPr>
-              <p:cNvPr id="85" name="Arc 28"/>
-              <p:cNvSpPr>
-                <a:spLocks/>
-              </p:cNvSpPr>
-              <p:nvPr/>
-            </p:nvSpPr>
-            <p:spPr bwMode="auto">
-              <a:xfrm flipH="1" flipV="1">
-                <a:off x="2889" y="2645"/>
-                <a:ext cx="2346" cy="2293"/>
-              </a:xfrm>
-              <a:custGeom>
-                <a:avLst/>
-                <a:gdLst>
-                  <a:gd name="T0" fmla="*/ 0 w 21600"/>
-                  <a:gd name="T1" fmla="*/ 0 h 21600"/>
-                  <a:gd name="T2" fmla="*/ 255 w 21600"/>
-                  <a:gd name="T3" fmla="*/ 243 h 21600"/>
-                  <a:gd name="T4" fmla="*/ 0 w 21600"/>
-                  <a:gd name="T5" fmla="*/ 243 h 21600"/>
-                  <a:gd name="T6" fmla="*/ 0 60000 65536"/>
-                  <a:gd name="T7" fmla="*/ 0 60000 65536"/>
-                  <a:gd name="T8" fmla="*/ 0 60000 65536"/>
-                  <a:gd name="T9" fmla="*/ 0 w 21600"/>
-                  <a:gd name="T10" fmla="*/ 0 h 21600"/>
-                  <a:gd name="T11" fmla="*/ 21600 w 21600"/>
-                  <a:gd name="T12" fmla="*/ 21600 h 21600"/>
-                </a:gdLst>
-                <a:ahLst/>
-                <a:cxnLst>
-                  <a:cxn ang="T6">
-                    <a:pos x="T0" y="T1"/>
-                  </a:cxn>
-                  <a:cxn ang="T7">
-                    <a:pos x="T2" y="T3"/>
-                  </a:cxn>
-                  <a:cxn ang="T8">
-                    <a:pos x="T4" y="T5"/>
-                  </a:cxn>
-                </a:cxnLst>
-                <a:rect l="T9" t="T10" r="T11" b="T12"/>
-                <a:pathLst>
-                  <a:path w="21600" h="21600" fill="none" extrusionOk="0">
-                    <a:moveTo>
-                      <a:pt x="-1" y="0"/>
-                    </a:moveTo>
-                    <a:cubicBezTo>
-                      <a:pt x="11929" y="0"/>
-                      <a:pt x="21600" y="9670"/>
-                      <a:pt x="21600" y="21600"/>
-                    </a:cubicBezTo>
-                  </a:path>
-                  <a:path w="21600" h="21600" stroke="0" extrusionOk="0">
-                    <a:moveTo>
-                      <a:pt x="-1" y="0"/>
-                    </a:moveTo>
-                    <a:cubicBezTo>
-                      <a:pt x="11929" y="0"/>
-                      <a:pt x="21600" y="9670"/>
-                      <a:pt x="21600" y="21600"/>
-                    </a:cubicBezTo>
-                    <a:lnTo>
-                      <a:pt x="0" y="21600"/>
-                    </a:lnTo>
-                    <a:close/>
-                  </a:path>
-                </a:pathLst>
-              </a:custGeom>
-              <a:noFill/>
-              <a:ln w="19050">
-                <a:solidFill>
-                  <a:srgbClr val="000000"/>
-                </a:solidFill>
-                <a:round/>
-                <a:headEnd/>
-                <a:tailEnd/>
-              </a:ln>
-            </p:spPr>
-            <p:txBody>
-              <a:bodyPr/>
-              <a:lstStyle/>
-              <a:p>
-                <a:endParaRPr lang="es-ES"/>
-              </a:p>
-            </p:txBody>
-          </p:sp>
-          <p:sp>
-            <p:nvSpPr>
-              <p:cNvPr id="86" name="Line 29"/>
-              <p:cNvSpPr>
-                <a:spLocks noChangeShapeType="1"/>
-              </p:cNvSpPr>
-              <p:nvPr/>
-            </p:nvSpPr>
-            <p:spPr bwMode="auto">
-              <a:xfrm>
-                <a:off x="5235" y="4938"/>
-                <a:ext cx="1174" cy="0"/>
-              </a:xfrm>
-              <a:prstGeom prst="line">
-                <a:avLst/>
-              </a:prstGeom>
-              <a:noFill/>
-              <a:ln w="19050">
-                <a:solidFill>
-                  <a:srgbClr val="000000"/>
-                </a:solidFill>
-                <a:round/>
-                <a:headEnd/>
-                <a:tailEnd/>
-              </a:ln>
-            </p:spPr>
-            <p:txBody>
-              <a:bodyPr/>
-              <a:lstStyle/>
-              <a:p>
-                <a:endParaRPr lang="es-ES"/>
-              </a:p>
-            </p:txBody>
-          </p:sp>
-          <p:sp>
-            <p:nvSpPr>
-              <p:cNvPr id="87" name="Rectangle 30"/>
-              <p:cNvSpPr>
-                <a:spLocks noChangeArrowheads="1"/>
-              </p:cNvSpPr>
-              <p:nvPr/>
-            </p:nvSpPr>
-            <p:spPr bwMode="auto">
-              <a:xfrm>
-                <a:off x="5235" y="2556"/>
-                <a:ext cx="1174" cy="156"/>
-              </a:xfrm>
-              <a:prstGeom prst="rect">
-                <a:avLst/>
-              </a:prstGeom>
-              <a:solidFill>
-                <a:srgbClr val="000000"/>
-              </a:solidFill>
-              <a:ln w="9525">
-                <a:solidFill>
-                  <a:srgbClr val="000000"/>
-                </a:solidFill>
-                <a:miter lim="800000"/>
-                <a:headEnd/>
-                <a:tailEnd/>
-              </a:ln>
-            </p:spPr>
-            <p:txBody>
-              <a:bodyPr/>
-              <a:lstStyle/>
-              <a:p>
-                <a:endParaRPr lang="es-ES"/>
-              </a:p>
-            </p:txBody>
-          </p:sp>
-          <p:sp>
-            <p:nvSpPr>
-              <p:cNvPr id="88" name="Arc 31"/>
-              <p:cNvSpPr>
-                <a:spLocks/>
-              </p:cNvSpPr>
-              <p:nvPr/>
-            </p:nvSpPr>
-            <p:spPr bwMode="auto">
-              <a:xfrm flipV="1">
-                <a:off x="6409" y="2645"/>
-                <a:ext cx="2346" cy="2293"/>
-              </a:xfrm>
-              <a:custGeom>
-                <a:avLst/>
-                <a:gdLst>
-                  <a:gd name="T0" fmla="*/ 0 w 21600"/>
-                  <a:gd name="T1" fmla="*/ 0 h 21600"/>
-                  <a:gd name="T2" fmla="*/ 255 w 21600"/>
-                  <a:gd name="T3" fmla="*/ 243 h 21600"/>
-                  <a:gd name="T4" fmla="*/ 0 w 21600"/>
-                  <a:gd name="T5" fmla="*/ 243 h 21600"/>
-                  <a:gd name="T6" fmla="*/ 0 60000 65536"/>
-                  <a:gd name="T7" fmla="*/ 0 60000 65536"/>
-                  <a:gd name="T8" fmla="*/ 0 60000 65536"/>
-                  <a:gd name="T9" fmla="*/ 0 w 21600"/>
-                  <a:gd name="T10" fmla="*/ 0 h 21600"/>
-                  <a:gd name="T11" fmla="*/ 21600 w 21600"/>
-                  <a:gd name="T12" fmla="*/ 21600 h 21600"/>
-                </a:gdLst>
-                <a:ahLst/>
-                <a:cxnLst>
-                  <a:cxn ang="T6">
-                    <a:pos x="T0" y="T1"/>
-                  </a:cxn>
-                  <a:cxn ang="T7">
-                    <a:pos x="T2" y="T3"/>
-                  </a:cxn>
-                  <a:cxn ang="T8">
-                    <a:pos x="T4" y="T5"/>
-                  </a:cxn>
-                </a:cxnLst>
-                <a:rect l="T9" t="T10" r="T11" b="T12"/>
-                <a:pathLst>
-                  <a:path w="21600" h="21600" fill="none" extrusionOk="0">
-                    <a:moveTo>
-                      <a:pt x="-1" y="0"/>
-                    </a:moveTo>
-                    <a:cubicBezTo>
-                      <a:pt x="11929" y="0"/>
-                      <a:pt x="21600" y="9670"/>
-                      <a:pt x="21600" y="21600"/>
-                    </a:cubicBezTo>
-                  </a:path>
-                  <a:path w="21600" h="21600" stroke="0" extrusionOk="0">
-                    <a:moveTo>
-                      <a:pt x="-1" y="0"/>
-                    </a:moveTo>
-                    <a:cubicBezTo>
-                      <a:pt x="11929" y="0"/>
-                      <a:pt x="21600" y="9670"/>
-                      <a:pt x="21600" y="21600"/>
-                    </a:cubicBezTo>
-                    <a:lnTo>
-                      <a:pt x="0" y="21600"/>
-                    </a:lnTo>
-                    <a:close/>
-                  </a:path>
-                </a:pathLst>
-              </a:custGeom>
-              <a:noFill/>
-              <a:ln w="19050">
-                <a:solidFill>
-                  <a:srgbClr val="000000"/>
-                </a:solidFill>
-                <a:round/>
-                <a:headEnd/>
-                <a:tailEnd/>
-              </a:ln>
-            </p:spPr>
-            <p:txBody>
-              <a:bodyPr/>
-              <a:lstStyle/>
-              <a:p>
-                <a:endParaRPr lang="es-ES"/>
-              </a:p>
-            </p:txBody>
-          </p:sp>
-          <p:sp>
-            <p:nvSpPr>
-              <p:cNvPr id="89" name="Arc 32"/>
-              <p:cNvSpPr>
-                <a:spLocks/>
-              </p:cNvSpPr>
-              <p:nvPr/>
-            </p:nvSpPr>
-            <p:spPr bwMode="auto">
-              <a:xfrm flipH="1" flipV="1">
-                <a:off x="1846" y="3792"/>
-                <a:ext cx="3389" cy="2293"/>
-              </a:xfrm>
-              <a:custGeom>
-                <a:avLst/>
-                <a:gdLst>
-                  <a:gd name="T0" fmla="*/ 0 w 21600"/>
-                  <a:gd name="T1" fmla="*/ 0 h 21600"/>
-                  <a:gd name="T2" fmla="*/ 532 w 21600"/>
-                  <a:gd name="T3" fmla="*/ 243 h 21600"/>
-                  <a:gd name="T4" fmla="*/ 0 w 21600"/>
-                  <a:gd name="T5" fmla="*/ 243 h 21600"/>
-                  <a:gd name="T6" fmla="*/ 0 60000 65536"/>
-                  <a:gd name="T7" fmla="*/ 0 60000 65536"/>
-                  <a:gd name="T8" fmla="*/ 0 60000 65536"/>
-                  <a:gd name="T9" fmla="*/ 0 w 21600"/>
-                  <a:gd name="T10" fmla="*/ 0 h 21600"/>
-                  <a:gd name="T11" fmla="*/ 21600 w 21600"/>
-                  <a:gd name="T12" fmla="*/ 21600 h 21600"/>
-                </a:gdLst>
-                <a:ahLst/>
-                <a:cxnLst>
-                  <a:cxn ang="T6">
-                    <a:pos x="T0" y="T1"/>
-                  </a:cxn>
-                  <a:cxn ang="T7">
-                    <a:pos x="T2" y="T3"/>
-                  </a:cxn>
-                  <a:cxn ang="T8">
-                    <a:pos x="T4" y="T5"/>
-                  </a:cxn>
-                </a:cxnLst>
-                <a:rect l="T9" t="T10" r="T11" b="T12"/>
-                <a:pathLst>
-                  <a:path w="21600" h="21600" fill="none" extrusionOk="0">
-                    <a:moveTo>
-                      <a:pt x="-1" y="0"/>
-                    </a:moveTo>
-                    <a:cubicBezTo>
-                      <a:pt x="11929" y="0"/>
-                      <a:pt x="21600" y="9670"/>
-                      <a:pt x="21600" y="21600"/>
-                    </a:cubicBezTo>
-                  </a:path>
-                  <a:path w="21600" h="21600" stroke="0" extrusionOk="0">
-                    <a:moveTo>
-                      <a:pt x="-1" y="0"/>
-                    </a:moveTo>
-                    <a:cubicBezTo>
-                      <a:pt x="11929" y="0"/>
-                      <a:pt x="21600" y="9670"/>
-                      <a:pt x="21600" y="21600"/>
-                    </a:cubicBezTo>
-                    <a:lnTo>
-                      <a:pt x="0" y="21600"/>
-                    </a:lnTo>
-                    <a:close/>
-                  </a:path>
-                </a:pathLst>
-              </a:custGeom>
-              <a:noFill/>
-              <a:ln w="19050">
-                <a:solidFill>
-                  <a:srgbClr val="000000"/>
-                </a:solidFill>
-                <a:prstDash val="dash"/>
-                <a:round/>
-                <a:headEnd/>
-                <a:tailEnd/>
-              </a:ln>
-            </p:spPr>
-            <p:txBody>
-              <a:bodyPr/>
-              <a:lstStyle/>
-              <a:p>
-                <a:endParaRPr lang="es-ES"/>
-              </a:p>
-            </p:txBody>
-          </p:sp>
-          <p:sp>
-            <p:nvSpPr>
-              <p:cNvPr id="90" name="Arc 33"/>
-              <p:cNvSpPr>
-                <a:spLocks/>
-              </p:cNvSpPr>
-              <p:nvPr/>
-            </p:nvSpPr>
-            <p:spPr bwMode="auto">
-              <a:xfrm flipV="1">
-                <a:off x="6409" y="3792"/>
-                <a:ext cx="3389" cy="2293"/>
-              </a:xfrm>
-              <a:custGeom>
-                <a:avLst/>
-                <a:gdLst>
-                  <a:gd name="T0" fmla="*/ 0 w 21600"/>
-                  <a:gd name="T1" fmla="*/ 0 h 21600"/>
-                  <a:gd name="T2" fmla="*/ 532 w 21600"/>
-                  <a:gd name="T3" fmla="*/ 243 h 21600"/>
-                  <a:gd name="T4" fmla="*/ 0 w 21600"/>
-                  <a:gd name="T5" fmla="*/ 243 h 21600"/>
-                  <a:gd name="T6" fmla="*/ 0 60000 65536"/>
-                  <a:gd name="T7" fmla="*/ 0 60000 65536"/>
-                  <a:gd name="T8" fmla="*/ 0 60000 65536"/>
-                  <a:gd name="T9" fmla="*/ 0 w 21600"/>
-                  <a:gd name="T10" fmla="*/ 0 h 21600"/>
-                  <a:gd name="T11" fmla="*/ 21600 w 21600"/>
-                  <a:gd name="T12" fmla="*/ 21600 h 21600"/>
-                </a:gdLst>
-                <a:ahLst/>
-                <a:cxnLst>
-                  <a:cxn ang="T6">
-                    <a:pos x="T0" y="T1"/>
-                  </a:cxn>
-                  <a:cxn ang="T7">
-                    <a:pos x="T2" y="T3"/>
-                  </a:cxn>
-                  <a:cxn ang="T8">
-                    <a:pos x="T4" y="T5"/>
-                  </a:cxn>
-                </a:cxnLst>
-                <a:rect l="T9" t="T10" r="T11" b="T12"/>
-                <a:pathLst>
-                  <a:path w="21600" h="21600" fill="none" extrusionOk="0">
-                    <a:moveTo>
-                      <a:pt x="-1" y="0"/>
-                    </a:moveTo>
-                    <a:cubicBezTo>
-                      <a:pt x="11929" y="0"/>
-                      <a:pt x="21600" y="9670"/>
-                      <a:pt x="21600" y="21600"/>
-                    </a:cubicBezTo>
-                  </a:path>
-                  <a:path w="21600" h="21600" stroke="0" extrusionOk="0">
-                    <a:moveTo>
-                      <a:pt x="-1" y="0"/>
-                    </a:moveTo>
-                    <a:cubicBezTo>
-                      <a:pt x="11929" y="0"/>
-                      <a:pt x="21600" y="9670"/>
-                      <a:pt x="21600" y="21600"/>
-                    </a:cubicBezTo>
-                    <a:lnTo>
-                      <a:pt x="0" y="21600"/>
-                    </a:lnTo>
-                    <a:close/>
-                  </a:path>
-                </a:pathLst>
-              </a:custGeom>
-              <a:noFill/>
-              <a:ln w="19050">
-                <a:solidFill>
-                  <a:srgbClr val="000000"/>
-                </a:solidFill>
-                <a:prstDash val="dash"/>
-                <a:round/>
-                <a:headEnd/>
-                <a:tailEnd/>
-              </a:ln>
-            </p:spPr>
-            <p:txBody>
-              <a:bodyPr/>
-              <a:lstStyle/>
-              <a:p>
-                <a:endParaRPr lang="es-ES"/>
-              </a:p>
-            </p:txBody>
-          </p:sp>
-          <p:sp>
-            <p:nvSpPr>
-              <p:cNvPr id="91" name="Line 34"/>
-              <p:cNvSpPr>
-                <a:spLocks noChangeShapeType="1"/>
-              </p:cNvSpPr>
-              <p:nvPr/>
-            </p:nvSpPr>
-            <p:spPr bwMode="auto">
-              <a:xfrm>
-                <a:off x="5235" y="6085"/>
-                <a:ext cx="1174" cy="0"/>
-              </a:xfrm>
-              <a:prstGeom prst="line">
-                <a:avLst/>
-              </a:prstGeom>
-              <a:noFill/>
-              <a:ln w="19050">
-                <a:solidFill>
-                  <a:srgbClr val="000000"/>
-                </a:solidFill>
-                <a:prstDash val="dash"/>
-                <a:round/>
-                <a:headEnd/>
-                <a:tailEnd/>
-              </a:ln>
-            </p:spPr>
-            <p:txBody>
-              <a:bodyPr/>
-              <a:lstStyle/>
-              <a:p>
-                <a:endParaRPr lang="es-ES"/>
-              </a:p>
-            </p:txBody>
-          </p:sp>
-        </p:grpSp>
         <p:sp>
           <p:nvSpPr>
-            <p:cNvPr id="56" name="Oval 35"/>
+            <p:cNvPr id="65" name="Oval 35"/>
             <p:cNvSpPr>
               <a:spLocks noChangeArrowheads="1"/>
             </p:cNvSpPr>
@@ -7251,7 +7158,7 @@
           </p:nvSpPr>
           <p:spPr bwMode="auto">
             <a:xfrm rot="10800000">
-              <a:off x="8001024" y="2214553"/>
+              <a:off x="6929454" y="4214818"/>
               <a:ext cx="142877" cy="145426"/>
             </a:xfrm>
             <a:prstGeom prst="ellipse">
@@ -7279,28 +7186,26 @@
         </p:sp>
         <p:sp>
           <p:nvSpPr>
-            <p:cNvPr id="57" name="AutoShape 36"/>
+            <p:cNvPr id="66" name="Oval 14"/>
             <p:cNvSpPr>
               <a:spLocks noChangeArrowheads="1"/>
             </p:cNvSpPr>
             <p:nvPr/>
           </p:nvSpPr>
           <p:spPr bwMode="auto">
-            <a:xfrm rot="12614040" flipV="1">
-              <a:off x="7236601" y="2687422"/>
-              <a:ext cx="214315" cy="142876"/>
+            <a:xfrm>
+              <a:off x="6858016" y="4286256"/>
+              <a:ext cx="71438" cy="71438"/>
             </a:xfrm>
-            <a:prstGeom prst="triangle">
-              <a:avLst>
-                <a:gd name="adj" fmla="val 50000"/>
-              </a:avLst>
+            <a:prstGeom prst="ellipse">
+              <a:avLst/>
             </a:prstGeom>
             <a:solidFill>
-              <a:srgbClr val="FF0000"/>
-            </a:solidFill>
-            <a:ln w="9525">
+              <a:srgbClr val="000000"/>
+            </a:solidFill>
+            <a:ln w="9360">
               <a:solidFill>
-                <a:srgbClr val="FF0000"/>
+                <a:srgbClr val="000000"/>
               </a:solidFill>
               <a:miter lim="800000"/>
               <a:headEnd/>
@@ -7308,265 +7213,7 @@
             </a:ln>
           </p:spPr>
           <p:txBody>
-            <a:bodyPr/>
-            <a:lstStyle/>
-            <a:p>
-              <a:endParaRPr lang="es-ES"/>
-            </a:p>
-          </p:txBody>
-        </p:sp>
-        <p:sp>
-          <p:nvSpPr>
-            <p:cNvPr id="58" name="AutoShape 51"/>
-            <p:cNvSpPr>
-              <a:spLocks noChangeArrowheads="1"/>
-            </p:cNvSpPr>
-            <p:nvPr/>
-          </p:nvSpPr>
-          <p:spPr bwMode="auto">
-            <a:xfrm rot="10800000" flipV="1">
-              <a:off x="6929454" y="2786059"/>
-              <a:ext cx="37236" cy="105834"/>
-            </a:xfrm>
-            <a:prstGeom prst="triangle">
-              <a:avLst>
-                <a:gd name="adj" fmla="val 50000"/>
-              </a:avLst>
-            </a:prstGeom>
-            <a:solidFill>
-              <a:srgbClr val="008000"/>
-            </a:solidFill>
-            <a:ln w="9525">
-              <a:solidFill>
-                <a:srgbClr val="008000"/>
-              </a:solidFill>
-              <a:miter lim="800000"/>
-              <a:headEnd/>
-              <a:tailEnd/>
-            </a:ln>
-          </p:spPr>
-          <p:txBody>
-            <a:bodyPr/>
-            <a:lstStyle/>
-            <a:p>
-              <a:endParaRPr lang="es-ES"/>
-            </a:p>
-          </p:txBody>
-        </p:sp>
-        <p:sp>
-          <p:nvSpPr>
-            <p:cNvPr id="60" name="Oval 35"/>
-            <p:cNvSpPr>
-              <a:spLocks noChangeArrowheads="1"/>
-            </p:cNvSpPr>
-            <p:nvPr/>
-          </p:nvSpPr>
-          <p:spPr bwMode="auto">
-            <a:xfrm rot="10800000">
-              <a:off x="8072462" y="2000239"/>
-              <a:ext cx="142877" cy="145426"/>
-            </a:xfrm>
-            <a:prstGeom prst="ellipse">
-              <a:avLst/>
-            </a:prstGeom>
-            <a:solidFill>
-              <a:srgbClr val="0000FF"/>
-            </a:solidFill>
-            <a:ln w="9525">
-              <a:solidFill>
-                <a:srgbClr val="0000FF"/>
-              </a:solidFill>
-              <a:round/>
-              <a:headEnd/>
-              <a:tailEnd/>
-            </a:ln>
-          </p:spPr>
-          <p:txBody>
-            <a:bodyPr/>
-            <a:lstStyle/>
-            <a:p>
-              <a:endParaRPr lang="es-ES"/>
-            </a:p>
-          </p:txBody>
-        </p:sp>
-        <p:sp>
-          <p:nvSpPr>
-            <p:cNvPr id="61" name="Oval 35"/>
-            <p:cNvSpPr>
-              <a:spLocks noChangeArrowheads="1"/>
-            </p:cNvSpPr>
-            <p:nvPr/>
-          </p:nvSpPr>
-          <p:spPr bwMode="auto">
-            <a:xfrm rot="10800000">
-              <a:off x="8143900" y="1785925"/>
-              <a:ext cx="142877" cy="145426"/>
-            </a:xfrm>
-            <a:prstGeom prst="ellipse">
-              <a:avLst/>
-            </a:prstGeom>
-            <a:solidFill>
-              <a:srgbClr val="0000FF"/>
-            </a:solidFill>
-            <a:ln w="9525">
-              <a:solidFill>
-                <a:srgbClr val="0000FF"/>
-              </a:solidFill>
-              <a:round/>
-              <a:headEnd/>
-              <a:tailEnd/>
-            </a:ln>
-          </p:spPr>
-          <p:txBody>
-            <a:bodyPr/>
-            <a:lstStyle/>
-            <a:p>
-              <a:endParaRPr lang="es-ES"/>
-            </a:p>
-          </p:txBody>
-        </p:sp>
-        <p:sp>
-          <p:nvSpPr>
-            <p:cNvPr id="68" name="AutoShape 36"/>
-            <p:cNvSpPr>
-              <a:spLocks noChangeArrowheads="1"/>
-            </p:cNvSpPr>
-            <p:nvPr/>
-          </p:nvSpPr>
-          <p:spPr bwMode="auto">
-            <a:xfrm rot="12614040" flipV="1">
-              <a:off x="7736667" y="2901737"/>
-              <a:ext cx="214315" cy="142876"/>
-            </a:xfrm>
-            <a:prstGeom prst="triangle">
-              <a:avLst>
-                <a:gd name="adj" fmla="val 50000"/>
-              </a:avLst>
-            </a:prstGeom>
-            <a:solidFill>
-              <a:srgbClr val="FF0000"/>
-            </a:solidFill>
-            <a:ln w="9525">
-              <a:solidFill>
-                <a:srgbClr val="FF0000"/>
-              </a:solidFill>
-              <a:miter lim="800000"/>
-              <a:headEnd/>
-              <a:tailEnd/>
-            </a:ln>
-          </p:spPr>
-          <p:txBody>
-            <a:bodyPr/>
-            <a:lstStyle/>
-            <a:p>
-              <a:endParaRPr lang="es-ES"/>
-            </a:p>
-          </p:txBody>
-        </p:sp>
-        <p:sp>
-          <p:nvSpPr>
-            <p:cNvPr id="83" name="Oval 35"/>
-            <p:cNvSpPr>
-              <a:spLocks noChangeArrowheads="1"/>
-            </p:cNvSpPr>
-            <p:nvPr/>
-          </p:nvSpPr>
-          <p:spPr bwMode="auto">
-            <a:xfrm rot="10800000">
-              <a:off x="7572396" y="2714621"/>
-              <a:ext cx="142877" cy="145426"/>
-            </a:xfrm>
-            <a:prstGeom prst="ellipse">
-              <a:avLst/>
-            </a:prstGeom>
-            <a:solidFill>
-              <a:srgbClr val="0000FF"/>
-            </a:solidFill>
-            <a:ln w="9525">
-              <a:solidFill>
-                <a:srgbClr val="0000FF"/>
-              </a:solidFill>
-              <a:round/>
-              <a:headEnd/>
-              <a:tailEnd/>
-            </a:ln>
-          </p:spPr>
-          <p:txBody>
-            <a:bodyPr/>
-            <a:lstStyle/>
-            <a:p>
-              <a:endParaRPr lang="es-ES"/>
-            </a:p>
-          </p:txBody>
-        </p:sp>
-        <p:sp>
-          <p:nvSpPr>
-            <p:cNvPr id="92" name="Oval 35"/>
-            <p:cNvSpPr>
-              <a:spLocks noChangeArrowheads="1"/>
-            </p:cNvSpPr>
-            <p:nvPr/>
-          </p:nvSpPr>
-          <p:spPr bwMode="auto">
-            <a:xfrm rot="10800000">
-              <a:off x="8358213" y="3283574"/>
-              <a:ext cx="142877" cy="145426"/>
-            </a:xfrm>
-            <a:prstGeom prst="ellipse">
-              <a:avLst/>
-            </a:prstGeom>
-            <a:solidFill>
-              <a:srgbClr val="0000FF"/>
-            </a:solidFill>
-            <a:ln w="9525">
-              <a:solidFill>
-                <a:srgbClr val="0000FF"/>
-              </a:solidFill>
-              <a:round/>
-              <a:headEnd/>
-              <a:tailEnd/>
-            </a:ln>
-          </p:spPr>
-          <p:txBody>
-            <a:bodyPr/>
-            <a:lstStyle/>
-            <a:p>
-              <a:endParaRPr lang="es-ES"/>
-            </a:p>
-          </p:txBody>
-        </p:sp>
-        <p:sp>
-          <p:nvSpPr>
-            <p:cNvPr id="93" name="AutoShape 36"/>
-            <p:cNvSpPr>
-              <a:spLocks noChangeArrowheads="1"/>
-            </p:cNvSpPr>
-            <p:nvPr/>
-          </p:nvSpPr>
-          <p:spPr bwMode="auto">
-            <a:xfrm rot="14678705" flipV="1">
-              <a:off x="8004311" y="3301573"/>
-              <a:ext cx="214315" cy="142876"/>
-            </a:xfrm>
-            <a:prstGeom prst="triangle">
-              <a:avLst>
-                <a:gd name="adj" fmla="val 50000"/>
-              </a:avLst>
-            </a:prstGeom>
-            <a:solidFill>
-              <a:srgbClr val="FF0000"/>
-            </a:solidFill>
-            <a:ln w="9525">
-              <a:solidFill>
-                <a:srgbClr val="FF0000"/>
-              </a:solidFill>
-              <a:miter lim="800000"/>
-              <a:headEnd/>
-              <a:tailEnd/>
-            </a:ln>
-          </p:spPr>
-          <p:txBody>
-            <a:bodyPr/>
+            <a:bodyPr wrap="none" anchor="ctr"/>
             <a:lstStyle/>
             <a:p>
               <a:endParaRPr lang="es-ES"/>
@@ -7574,934 +7221,199 @@
           </p:txBody>
         </p:sp>
       </p:grpSp>
-      <p:grpSp>
-        <p:nvGrpSpPr>
-          <p:cNvPr id="126" name="125 Grupo"/>
-          <p:cNvGrpSpPr/>
-          <p:nvPr/>
-        </p:nvGrpSpPr>
-        <p:grpSpPr>
-          <a:xfrm>
-            <a:off x="5429256" y="4000504"/>
-            <a:ext cx="3071834" cy="2214578"/>
-            <a:chOff x="5429256" y="1571612"/>
-            <a:chExt cx="3071834" cy="2214578"/>
-          </a:xfrm>
-        </p:grpSpPr>
-        <p:grpSp>
-          <p:nvGrpSpPr>
-            <p:cNvPr id="127" name="Group 26"/>
-            <p:cNvGrpSpPr>
-              <a:grpSpLocks/>
-            </p:cNvGrpSpPr>
-            <p:nvPr/>
-          </p:nvGrpSpPr>
-          <p:grpSpPr bwMode="auto">
-            <a:xfrm rot="10800000">
-              <a:off x="5429256" y="1571612"/>
-              <a:ext cx="3071834" cy="2214578"/>
-              <a:chOff x="1846" y="2556"/>
-              <a:chExt cx="7952" cy="5822"/>
-            </a:xfrm>
-          </p:grpSpPr>
-          <p:sp>
-            <p:nvSpPr>
-              <p:cNvPr id="137" name="Rectangle 27"/>
-              <p:cNvSpPr>
-                <a:spLocks noChangeArrowheads="1"/>
-              </p:cNvSpPr>
-              <p:nvPr/>
-            </p:nvSpPr>
-            <p:spPr bwMode="auto">
-              <a:xfrm>
-                <a:off x="1846" y="2645"/>
-                <a:ext cx="7952" cy="5733"/>
-              </a:xfrm>
-              <a:prstGeom prst="rect">
-                <a:avLst/>
-              </a:prstGeom>
-              <a:solidFill>
-                <a:srgbClr val="FFFFFF"/>
-              </a:solidFill>
-              <a:ln w="25400">
-                <a:solidFill>
-                  <a:srgbClr val="000000"/>
-                </a:solidFill>
-                <a:miter lim="800000"/>
-                <a:headEnd/>
-                <a:tailEnd/>
-              </a:ln>
-            </p:spPr>
-            <p:txBody>
-              <a:bodyPr/>
-              <a:lstStyle/>
-              <a:p>
-                <a:endParaRPr lang="es-ES"/>
-              </a:p>
-            </p:txBody>
-          </p:sp>
-          <p:sp>
-            <p:nvSpPr>
-              <p:cNvPr id="138" name="Arc 28"/>
-              <p:cNvSpPr>
-                <a:spLocks/>
-              </p:cNvSpPr>
-              <p:nvPr/>
-            </p:nvSpPr>
-            <p:spPr bwMode="auto">
-              <a:xfrm flipH="1" flipV="1">
-                <a:off x="2889" y="2645"/>
-                <a:ext cx="2346" cy="2293"/>
-              </a:xfrm>
-              <a:custGeom>
-                <a:avLst/>
-                <a:gdLst>
-                  <a:gd name="T0" fmla="*/ 0 w 21600"/>
-                  <a:gd name="T1" fmla="*/ 0 h 21600"/>
-                  <a:gd name="T2" fmla="*/ 255 w 21600"/>
-                  <a:gd name="T3" fmla="*/ 243 h 21600"/>
-                  <a:gd name="T4" fmla="*/ 0 w 21600"/>
-                  <a:gd name="T5" fmla="*/ 243 h 21600"/>
-                  <a:gd name="T6" fmla="*/ 0 60000 65536"/>
-                  <a:gd name="T7" fmla="*/ 0 60000 65536"/>
-                  <a:gd name="T8" fmla="*/ 0 60000 65536"/>
-                  <a:gd name="T9" fmla="*/ 0 w 21600"/>
-                  <a:gd name="T10" fmla="*/ 0 h 21600"/>
-                  <a:gd name="T11" fmla="*/ 21600 w 21600"/>
-                  <a:gd name="T12" fmla="*/ 21600 h 21600"/>
-                </a:gdLst>
-                <a:ahLst/>
-                <a:cxnLst>
-                  <a:cxn ang="T6">
-                    <a:pos x="T0" y="T1"/>
-                  </a:cxn>
-                  <a:cxn ang="T7">
-                    <a:pos x="T2" y="T3"/>
-                  </a:cxn>
-                  <a:cxn ang="T8">
-                    <a:pos x="T4" y="T5"/>
-                  </a:cxn>
-                </a:cxnLst>
-                <a:rect l="T9" t="T10" r="T11" b="T12"/>
-                <a:pathLst>
-                  <a:path w="21600" h="21600" fill="none" extrusionOk="0">
-                    <a:moveTo>
-                      <a:pt x="-1" y="0"/>
-                    </a:moveTo>
-                    <a:cubicBezTo>
-                      <a:pt x="11929" y="0"/>
-                      <a:pt x="21600" y="9670"/>
-                      <a:pt x="21600" y="21600"/>
-                    </a:cubicBezTo>
-                  </a:path>
-                  <a:path w="21600" h="21600" stroke="0" extrusionOk="0">
-                    <a:moveTo>
-                      <a:pt x="-1" y="0"/>
-                    </a:moveTo>
-                    <a:cubicBezTo>
-                      <a:pt x="11929" y="0"/>
-                      <a:pt x="21600" y="9670"/>
-                      <a:pt x="21600" y="21600"/>
-                    </a:cubicBezTo>
-                    <a:lnTo>
-                      <a:pt x="0" y="21600"/>
-                    </a:lnTo>
-                    <a:close/>
-                  </a:path>
-                </a:pathLst>
-              </a:custGeom>
-              <a:noFill/>
-              <a:ln w="19050">
-                <a:solidFill>
-                  <a:srgbClr val="000000"/>
-                </a:solidFill>
-                <a:round/>
-                <a:headEnd/>
-                <a:tailEnd/>
-              </a:ln>
-            </p:spPr>
-            <p:txBody>
-              <a:bodyPr/>
-              <a:lstStyle/>
-              <a:p>
-                <a:endParaRPr lang="es-ES"/>
-              </a:p>
-            </p:txBody>
-          </p:sp>
-          <p:sp>
-            <p:nvSpPr>
-              <p:cNvPr id="139" name="Line 29"/>
-              <p:cNvSpPr>
-                <a:spLocks noChangeShapeType="1"/>
-              </p:cNvSpPr>
-              <p:nvPr/>
-            </p:nvSpPr>
-            <p:spPr bwMode="auto">
-              <a:xfrm>
-                <a:off x="5235" y="4938"/>
-                <a:ext cx="1174" cy="0"/>
-              </a:xfrm>
-              <a:prstGeom prst="line">
-                <a:avLst/>
-              </a:prstGeom>
-              <a:noFill/>
-              <a:ln w="19050">
-                <a:solidFill>
-                  <a:srgbClr val="000000"/>
-                </a:solidFill>
-                <a:round/>
-                <a:headEnd/>
-                <a:tailEnd/>
-              </a:ln>
-            </p:spPr>
-            <p:txBody>
-              <a:bodyPr/>
-              <a:lstStyle/>
-              <a:p>
-                <a:endParaRPr lang="es-ES"/>
-              </a:p>
-            </p:txBody>
-          </p:sp>
-          <p:sp>
-            <p:nvSpPr>
-              <p:cNvPr id="140" name="Rectangle 30"/>
-              <p:cNvSpPr>
-                <a:spLocks noChangeArrowheads="1"/>
-              </p:cNvSpPr>
-              <p:nvPr/>
-            </p:nvSpPr>
-            <p:spPr bwMode="auto">
-              <a:xfrm>
-                <a:off x="5235" y="2556"/>
-                <a:ext cx="1174" cy="156"/>
-              </a:xfrm>
-              <a:prstGeom prst="rect">
-                <a:avLst/>
-              </a:prstGeom>
-              <a:solidFill>
-                <a:srgbClr val="000000"/>
-              </a:solidFill>
-              <a:ln w="9525">
-                <a:solidFill>
-                  <a:srgbClr val="000000"/>
-                </a:solidFill>
-                <a:miter lim="800000"/>
-                <a:headEnd/>
-                <a:tailEnd/>
-              </a:ln>
-            </p:spPr>
-            <p:txBody>
-              <a:bodyPr/>
-              <a:lstStyle/>
-              <a:p>
-                <a:endParaRPr lang="es-ES"/>
-              </a:p>
-            </p:txBody>
-          </p:sp>
-          <p:sp>
-            <p:nvSpPr>
-              <p:cNvPr id="141" name="Arc 31"/>
-              <p:cNvSpPr>
-                <a:spLocks/>
-              </p:cNvSpPr>
-              <p:nvPr/>
-            </p:nvSpPr>
-            <p:spPr bwMode="auto">
-              <a:xfrm flipV="1">
-                <a:off x="6409" y="2645"/>
-                <a:ext cx="2346" cy="2293"/>
-              </a:xfrm>
-              <a:custGeom>
-                <a:avLst/>
-                <a:gdLst>
-                  <a:gd name="T0" fmla="*/ 0 w 21600"/>
-                  <a:gd name="T1" fmla="*/ 0 h 21600"/>
-                  <a:gd name="T2" fmla="*/ 255 w 21600"/>
-                  <a:gd name="T3" fmla="*/ 243 h 21600"/>
-                  <a:gd name="T4" fmla="*/ 0 w 21600"/>
-                  <a:gd name="T5" fmla="*/ 243 h 21600"/>
-                  <a:gd name="T6" fmla="*/ 0 60000 65536"/>
-                  <a:gd name="T7" fmla="*/ 0 60000 65536"/>
-                  <a:gd name="T8" fmla="*/ 0 60000 65536"/>
-                  <a:gd name="T9" fmla="*/ 0 w 21600"/>
-                  <a:gd name="T10" fmla="*/ 0 h 21600"/>
-                  <a:gd name="T11" fmla="*/ 21600 w 21600"/>
-                  <a:gd name="T12" fmla="*/ 21600 h 21600"/>
-                </a:gdLst>
-                <a:ahLst/>
-                <a:cxnLst>
-                  <a:cxn ang="T6">
-                    <a:pos x="T0" y="T1"/>
-                  </a:cxn>
-                  <a:cxn ang="T7">
-                    <a:pos x="T2" y="T3"/>
-                  </a:cxn>
-                  <a:cxn ang="T8">
-                    <a:pos x="T4" y="T5"/>
-                  </a:cxn>
-                </a:cxnLst>
-                <a:rect l="T9" t="T10" r="T11" b="T12"/>
-                <a:pathLst>
-                  <a:path w="21600" h="21600" fill="none" extrusionOk="0">
-                    <a:moveTo>
-                      <a:pt x="-1" y="0"/>
-                    </a:moveTo>
-                    <a:cubicBezTo>
-                      <a:pt x="11929" y="0"/>
-                      <a:pt x="21600" y="9670"/>
-                      <a:pt x="21600" y="21600"/>
-                    </a:cubicBezTo>
-                  </a:path>
-                  <a:path w="21600" h="21600" stroke="0" extrusionOk="0">
-                    <a:moveTo>
-                      <a:pt x="-1" y="0"/>
-                    </a:moveTo>
-                    <a:cubicBezTo>
-                      <a:pt x="11929" y="0"/>
-                      <a:pt x="21600" y="9670"/>
-                      <a:pt x="21600" y="21600"/>
-                    </a:cubicBezTo>
-                    <a:lnTo>
-                      <a:pt x="0" y="21600"/>
-                    </a:lnTo>
-                    <a:close/>
-                  </a:path>
-                </a:pathLst>
-              </a:custGeom>
-              <a:noFill/>
-              <a:ln w="19050">
-                <a:solidFill>
-                  <a:srgbClr val="000000"/>
-                </a:solidFill>
-                <a:round/>
-                <a:headEnd/>
-                <a:tailEnd/>
-              </a:ln>
-            </p:spPr>
-            <p:txBody>
-              <a:bodyPr/>
-              <a:lstStyle/>
-              <a:p>
-                <a:endParaRPr lang="es-ES"/>
-              </a:p>
-            </p:txBody>
-          </p:sp>
-          <p:sp>
-            <p:nvSpPr>
-              <p:cNvPr id="142" name="Arc 32"/>
-              <p:cNvSpPr>
-                <a:spLocks/>
-              </p:cNvSpPr>
-              <p:nvPr/>
-            </p:nvSpPr>
-            <p:spPr bwMode="auto">
-              <a:xfrm flipH="1" flipV="1">
-                <a:off x="1846" y="3792"/>
-                <a:ext cx="3389" cy="2293"/>
-              </a:xfrm>
-              <a:custGeom>
-                <a:avLst/>
-                <a:gdLst>
-                  <a:gd name="T0" fmla="*/ 0 w 21600"/>
-                  <a:gd name="T1" fmla="*/ 0 h 21600"/>
-                  <a:gd name="T2" fmla="*/ 532 w 21600"/>
-                  <a:gd name="T3" fmla="*/ 243 h 21600"/>
-                  <a:gd name="T4" fmla="*/ 0 w 21600"/>
-                  <a:gd name="T5" fmla="*/ 243 h 21600"/>
-                  <a:gd name="T6" fmla="*/ 0 60000 65536"/>
-                  <a:gd name="T7" fmla="*/ 0 60000 65536"/>
-                  <a:gd name="T8" fmla="*/ 0 60000 65536"/>
-                  <a:gd name="T9" fmla="*/ 0 w 21600"/>
-                  <a:gd name="T10" fmla="*/ 0 h 21600"/>
-                  <a:gd name="T11" fmla="*/ 21600 w 21600"/>
-                  <a:gd name="T12" fmla="*/ 21600 h 21600"/>
-                </a:gdLst>
-                <a:ahLst/>
-                <a:cxnLst>
-                  <a:cxn ang="T6">
-                    <a:pos x="T0" y="T1"/>
-                  </a:cxn>
-                  <a:cxn ang="T7">
-                    <a:pos x="T2" y="T3"/>
-                  </a:cxn>
-                  <a:cxn ang="T8">
-                    <a:pos x="T4" y="T5"/>
-                  </a:cxn>
-                </a:cxnLst>
-                <a:rect l="T9" t="T10" r="T11" b="T12"/>
-                <a:pathLst>
-                  <a:path w="21600" h="21600" fill="none" extrusionOk="0">
-                    <a:moveTo>
-                      <a:pt x="-1" y="0"/>
-                    </a:moveTo>
-                    <a:cubicBezTo>
-                      <a:pt x="11929" y="0"/>
-                      <a:pt x="21600" y="9670"/>
-                      <a:pt x="21600" y="21600"/>
-                    </a:cubicBezTo>
-                  </a:path>
-                  <a:path w="21600" h="21600" stroke="0" extrusionOk="0">
-                    <a:moveTo>
-                      <a:pt x="-1" y="0"/>
-                    </a:moveTo>
-                    <a:cubicBezTo>
-                      <a:pt x="11929" y="0"/>
-                      <a:pt x="21600" y="9670"/>
-                      <a:pt x="21600" y="21600"/>
-                    </a:cubicBezTo>
-                    <a:lnTo>
-                      <a:pt x="0" y="21600"/>
-                    </a:lnTo>
-                    <a:close/>
-                  </a:path>
-                </a:pathLst>
-              </a:custGeom>
-              <a:noFill/>
-              <a:ln w="19050">
-                <a:solidFill>
-                  <a:srgbClr val="000000"/>
-                </a:solidFill>
-                <a:prstDash val="dash"/>
-                <a:round/>
-                <a:headEnd/>
-                <a:tailEnd/>
-              </a:ln>
-            </p:spPr>
-            <p:txBody>
-              <a:bodyPr/>
-              <a:lstStyle/>
-              <a:p>
-                <a:endParaRPr lang="es-ES"/>
-              </a:p>
-            </p:txBody>
-          </p:sp>
-          <p:sp>
-            <p:nvSpPr>
-              <p:cNvPr id="143" name="Arc 33"/>
-              <p:cNvSpPr>
-                <a:spLocks/>
-              </p:cNvSpPr>
-              <p:nvPr/>
-            </p:nvSpPr>
-            <p:spPr bwMode="auto">
-              <a:xfrm flipV="1">
-                <a:off x="6409" y="3792"/>
-                <a:ext cx="3389" cy="2293"/>
-              </a:xfrm>
-              <a:custGeom>
-                <a:avLst/>
-                <a:gdLst>
-                  <a:gd name="T0" fmla="*/ 0 w 21600"/>
-                  <a:gd name="T1" fmla="*/ 0 h 21600"/>
-                  <a:gd name="T2" fmla="*/ 532 w 21600"/>
-                  <a:gd name="T3" fmla="*/ 243 h 21600"/>
-                  <a:gd name="T4" fmla="*/ 0 w 21600"/>
-                  <a:gd name="T5" fmla="*/ 243 h 21600"/>
-                  <a:gd name="T6" fmla="*/ 0 60000 65536"/>
-                  <a:gd name="T7" fmla="*/ 0 60000 65536"/>
-                  <a:gd name="T8" fmla="*/ 0 60000 65536"/>
-                  <a:gd name="T9" fmla="*/ 0 w 21600"/>
-                  <a:gd name="T10" fmla="*/ 0 h 21600"/>
-                  <a:gd name="T11" fmla="*/ 21600 w 21600"/>
-                  <a:gd name="T12" fmla="*/ 21600 h 21600"/>
-                </a:gdLst>
-                <a:ahLst/>
-                <a:cxnLst>
-                  <a:cxn ang="T6">
-                    <a:pos x="T0" y="T1"/>
-                  </a:cxn>
-                  <a:cxn ang="T7">
-                    <a:pos x="T2" y="T3"/>
-                  </a:cxn>
-                  <a:cxn ang="T8">
-                    <a:pos x="T4" y="T5"/>
-                  </a:cxn>
-                </a:cxnLst>
-                <a:rect l="T9" t="T10" r="T11" b="T12"/>
-                <a:pathLst>
-                  <a:path w="21600" h="21600" fill="none" extrusionOk="0">
-                    <a:moveTo>
-                      <a:pt x="-1" y="0"/>
-                    </a:moveTo>
-                    <a:cubicBezTo>
-                      <a:pt x="11929" y="0"/>
-                      <a:pt x="21600" y="9670"/>
-                      <a:pt x="21600" y="21600"/>
-                    </a:cubicBezTo>
-                  </a:path>
-                  <a:path w="21600" h="21600" stroke="0" extrusionOk="0">
-                    <a:moveTo>
-                      <a:pt x="-1" y="0"/>
-                    </a:moveTo>
-                    <a:cubicBezTo>
-                      <a:pt x="11929" y="0"/>
-                      <a:pt x="21600" y="9670"/>
-                      <a:pt x="21600" y="21600"/>
-                    </a:cubicBezTo>
-                    <a:lnTo>
-                      <a:pt x="0" y="21600"/>
-                    </a:lnTo>
-                    <a:close/>
-                  </a:path>
-                </a:pathLst>
-              </a:custGeom>
-              <a:noFill/>
-              <a:ln w="19050">
-                <a:solidFill>
-                  <a:srgbClr val="000000"/>
-                </a:solidFill>
-                <a:prstDash val="dash"/>
-                <a:round/>
-                <a:headEnd/>
-                <a:tailEnd/>
-              </a:ln>
-            </p:spPr>
-            <p:txBody>
-              <a:bodyPr/>
-              <a:lstStyle/>
-              <a:p>
-                <a:endParaRPr lang="es-ES"/>
-              </a:p>
-            </p:txBody>
-          </p:sp>
-          <p:sp>
-            <p:nvSpPr>
-              <p:cNvPr id="144" name="Line 34"/>
-              <p:cNvSpPr>
-                <a:spLocks noChangeShapeType="1"/>
-              </p:cNvSpPr>
-              <p:nvPr/>
-            </p:nvSpPr>
-            <p:spPr bwMode="auto">
-              <a:xfrm>
-                <a:off x="5235" y="6085"/>
-                <a:ext cx="1174" cy="0"/>
-              </a:xfrm>
-              <a:prstGeom prst="line">
-                <a:avLst/>
-              </a:prstGeom>
-              <a:noFill/>
-              <a:ln w="19050">
-                <a:solidFill>
-                  <a:srgbClr val="000000"/>
-                </a:solidFill>
-                <a:prstDash val="dash"/>
-                <a:round/>
-                <a:headEnd/>
-                <a:tailEnd/>
-              </a:ln>
-            </p:spPr>
-            <p:txBody>
-              <a:bodyPr/>
-              <a:lstStyle/>
-              <a:p>
-                <a:endParaRPr lang="es-ES"/>
-              </a:p>
-            </p:txBody>
-          </p:sp>
-        </p:grpSp>
-        <p:sp>
-          <p:nvSpPr>
-            <p:cNvPr id="128" name="Oval 35"/>
-            <p:cNvSpPr>
-              <a:spLocks noChangeArrowheads="1"/>
-            </p:cNvSpPr>
-            <p:nvPr/>
-          </p:nvSpPr>
-          <p:spPr bwMode="auto">
-            <a:xfrm rot="10800000">
-              <a:off x="8001024" y="2214553"/>
-              <a:ext cx="142877" cy="145426"/>
-            </a:xfrm>
-            <a:prstGeom prst="ellipse">
-              <a:avLst/>
-            </a:prstGeom>
-            <a:solidFill>
-              <a:srgbClr val="0000FF"/>
-            </a:solidFill>
-            <a:ln w="9525">
-              <a:solidFill>
-                <a:srgbClr val="0000FF"/>
-              </a:solidFill>
-              <a:round/>
-              <a:headEnd/>
-              <a:tailEnd/>
-            </a:ln>
-          </p:spPr>
-          <p:txBody>
-            <a:bodyPr/>
-            <a:lstStyle/>
-            <a:p>
-              <a:endParaRPr lang="es-ES"/>
-            </a:p>
-          </p:txBody>
-        </p:sp>
-        <p:sp>
-          <p:nvSpPr>
-            <p:cNvPr id="129" name="AutoShape 36"/>
-            <p:cNvSpPr>
-              <a:spLocks noChangeArrowheads="1"/>
-            </p:cNvSpPr>
-            <p:nvPr/>
-          </p:nvSpPr>
-          <p:spPr bwMode="auto">
-            <a:xfrm rot="12614040" flipV="1">
-              <a:off x="7450916" y="2544546"/>
-              <a:ext cx="214315" cy="142876"/>
-            </a:xfrm>
-            <a:prstGeom prst="triangle">
-              <a:avLst>
-                <a:gd name="adj" fmla="val 50000"/>
-              </a:avLst>
-            </a:prstGeom>
+      <p:sp>
+        <p:nvSpPr>
+          <p:cNvPr id="71" name="AutoShape 36"/>
+          <p:cNvSpPr>
+            <a:spLocks noChangeArrowheads="1"/>
+          </p:cNvSpPr>
+          <p:nvPr/>
+        </p:nvSpPr>
+        <p:spPr bwMode="auto">
+          <a:xfrm rot="9538011" flipV="1">
+            <a:off x="6233574" y="2819758"/>
+            <a:ext cx="214315" cy="142876"/>
+          </a:xfrm>
+          <a:prstGeom prst="triangle">
+            <a:avLst>
+              <a:gd name="adj" fmla="val 50000"/>
+            </a:avLst>
+          </a:prstGeom>
+          <a:solidFill>
+            <a:srgbClr val="FF0000"/>
+          </a:solidFill>
+          <a:ln w="9525">
             <a:solidFill>
               <a:srgbClr val="FF0000"/>
             </a:solidFill>
-            <a:ln w="9525">
-              <a:solidFill>
-                <a:srgbClr val="FF0000"/>
-              </a:solidFill>
-              <a:miter lim="800000"/>
-              <a:headEnd/>
-              <a:tailEnd/>
-            </a:ln>
-          </p:spPr>
-          <p:txBody>
-            <a:bodyPr/>
-            <a:lstStyle/>
-            <a:p>
-              <a:endParaRPr lang="es-ES"/>
-            </a:p>
-          </p:txBody>
-        </p:sp>
-        <p:sp>
-          <p:nvSpPr>
-            <p:cNvPr id="130" name="AutoShape 51"/>
-            <p:cNvSpPr>
-              <a:spLocks noChangeArrowheads="1"/>
-            </p:cNvSpPr>
-            <p:nvPr/>
-          </p:nvSpPr>
-          <p:spPr bwMode="auto">
-            <a:xfrm rot="10800000" flipV="1">
-              <a:off x="6929454" y="2786059"/>
-              <a:ext cx="37236" cy="105834"/>
-            </a:xfrm>
-            <a:prstGeom prst="triangle">
-              <a:avLst>
-                <a:gd name="adj" fmla="val 50000"/>
-              </a:avLst>
-            </a:prstGeom>
-            <a:solidFill>
-              <a:srgbClr val="008000"/>
-            </a:solidFill>
-            <a:ln w="9525">
-              <a:solidFill>
-                <a:srgbClr val="008000"/>
-              </a:solidFill>
-              <a:miter lim="800000"/>
-              <a:headEnd/>
-              <a:tailEnd/>
-            </a:ln>
-          </p:spPr>
-          <p:txBody>
-            <a:bodyPr/>
-            <a:lstStyle/>
-            <a:p>
-              <a:endParaRPr lang="es-ES"/>
-            </a:p>
-          </p:txBody>
-        </p:sp>
-        <p:sp>
-          <p:nvSpPr>
-            <p:cNvPr id="131" name="Oval 35"/>
-            <p:cNvSpPr>
-              <a:spLocks noChangeArrowheads="1"/>
-            </p:cNvSpPr>
-            <p:nvPr/>
-          </p:nvSpPr>
-          <p:spPr bwMode="auto">
-            <a:xfrm rot="10800000">
-              <a:off x="8072462" y="2000239"/>
-              <a:ext cx="142877" cy="145426"/>
-            </a:xfrm>
-            <a:prstGeom prst="ellipse">
-              <a:avLst/>
-            </a:prstGeom>
-            <a:solidFill>
-              <a:srgbClr val="0000FF"/>
-            </a:solidFill>
-            <a:ln w="9525">
-              <a:solidFill>
-                <a:srgbClr val="0000FF"/>
-              </a:solidFill>
-              <a:round/>
-              <a:headEnd/>
-              <a:tailEnd/>
-            </a:ln>
-          </p:spPr>
-          <p:txBody>
-            <a:bodyPr/>
-            <a:lstStyle/>
-            <a:p>
-              <a:endParaRPr lang="es-ES"/>
-            </a:p>
-          </p:txBody>
-        </p:sp>
-        <p:sp>
-          <p:nvSpPr>
-            <p:cNvPr id="132" name="Oval 35"/>
-            <p:cNvSpPr>
-              <a:spLocks noChangeArrowheads="1"/>
-            </p:cNvSpPr>
-            <p:nvPr/>
-          </p:nvSpPr>
-          <p:spPr bwMode="auto">
-            <a:xfrm rot="10800000">
-              <a:off x="8143900" y="1785925"/>
-              <a:ext cx="142877" cy="145426"/>
-            </a:xfrm>
-            <a:prstGeom prst="ellipse">
-              <a:avLst/>
-            </a:prstGeom>
-            <a:solidFill>
-              <a:srgbClr val="0000FF"/>
-            </a:solidFill>
-            <a:ln w="9525">
-              <a:solidFill>
-                <a:srgbClr val="0000FF"/>
-              </a:solidFill>
-              <a:round/>
-              <a:headEnd/>
-              <a:tailEnd/>
-            </a:ln>
-          </p:spPr>
-          <p:txBody>
-            <a:bodyPr/>
-            <a:lstStyle/>
-            <a:p>
-              <a:endParaRPr lang="es-ES"/>
-            </a:p>
-          </p:txBody>
-        </p:sp>
-        <p:sp>
-          <p:nvSpPr>
-            <p:cNvPr id="133" name="AutoShape 36"/>
-            <p:cNvSpPr>
-              <a:spLocks noChangeArrowheads="1"/>
-            </p:cNvSpPr>
-            <p:nvPr/>
-          </p:nvSpPr>
-          <p:spPr bwMode="auto">
-            <a:xfrm rot="12614040" flipV="1">
-              <a:off x="7736667" y="2901737"/>
-              <a:ext cx="214315" cy="142876"/>
-            </a:xfrm>
-            <a:prstGeom prst="triangle">
-              <a:avLst>
-                <a:gd name="adj" fmla="val 50000"/>
-              </a:avLst>
-            </a:prstGeom>
+            <a:miter lim="800000"/>
+            <a:headEnd/>
+            <a:tailEnd/>
+          </a:ln>
+        </p:spPr>
+        <p:txBody>
+          <a:bodyPr/>
+          <a:lstStyle/>
+          <a:p>
+            <a:endParaRPr lang="es-ES"/>
+          </a:p>
+        </p:txBody>
+      </p:sp>
+      <p:sp>
+        <p:nvSpPr>
+          <p:cNvPr id="72" name="AutoShape 36"/>
+          <p:cNvSpPr>
+            <a:spLocks noChangeArrowheads="1"/>
+          </p:cNvSpPr>
+          <p:nvPr/>
+        </p:nvSpPr>
+        <p:spPr bwMode="auto">
+          <a:xfrm rot="12794317" flipV="1">
+            <a:off x="7594021" y="2761668"/>
+            <a:ext cx="214315" cy="142876"/>
+          </a:xfrm>
+          <a:prstGeom prst="triangle">
+            <a:avLst>
+              <a:gd name="adj" fmla="val 50000"/>
+            </a:avLst>
+          </a:prstGeom>
+          <a:solidFill>
+            <a:srgbClr val="FF0000"/>
+          </a:solidFill>
+          <a:ln w="9525">
             <a:solidFill>
               <a:srgbClr val="FF0000"/>
             </a:solidFill>
-            <a:ln w="9525">
-              <a:solidFill>
-                <a:srgbClr val="FF0000"/>
-              </a:solidFill>
-              <a:miter lim="800000"/>
-              <a:headEnd/>
-              <a:tailEnd/>
-            </a:ln>
-          </p:spPr>
-          <p:txBody>
-            <a:bodyPr/>
-            <a:lstStyle/>
-            <a:p>
-              <a:endParaRPr lang="es-ES"/>
-            </a:p>
-          </p:txBody>
-        </p:sp>
-        <p:sp>
-          <p:nvSpPr>
-            <p:cNvPr id="134" name="Oval 35"/>
-            <p:cNvSpPr>
-              <a:spLocks noChangeArrowheads="1"/>
-            </p:cNvSpPr>
-            <p:nvPr/>
-          </p:nvSpPr>
-          <p:spPr bwMode="auto">
-            <a:xfrm rot="10800000">
-              <a:off x="7929586" y="3071810"/>
-              <a:ext cx="142877" cy="145426"/>
-            </a:xfrm>
-            <a:prstGeom prst="ellipse">
-              <a:avLst/>
-            </a:prstGeom>
-            <a:solidFill>
-              <a:srgbClr val="0000FF"/>
-            </a:solidFill>
-            <a:ln w="9525">
-              <a:solidFill>
-                <a:srgbClr val="0000FF"/>
-              </a:solidFill>
-              <a:round/>
-              <a:headEnd/>
-              <a:tailEnd/>
-            </a:ln>
-          </p:spPr>
-          <p:txBody>
-            <a:bodyPr/>
-            <a:lstStyle/>
-            <a:p>
-              <a:endParaRPr lang="es-ES"/>
-            </a:p>
-          </p:txBody>
-        </p:sp>
-        <p:sp>
-          <p:nvSpPr>
-            <p:cNvPr id="135" name="Oval 35"/>
-            <p:cNvSpPr>
-              <a:spLocks noChangeArrowheads="1"/>
-            </p:cNvSpPr>
-            <p:nvPr/>
-          </p:nvSpPr>
-          <p:spPr bwMode="auto">
-            <a:xfrm rot="10800000">
-              <a:off x="8358213" y="3283574"/>
-              <a:ext cx="142877" cy="145426"/>
-            </a:xfrm>
-            <a:prstGeom prst="ellipse">
-              <a:avLst/>
-            </a:prstGeom>
-            <a:solidFill>
-              <a:srgbClr val="0000FF"/>
-            </a:solidFill>
-            <a:ln w="9525">
-              <a:solidFill>
-                <a:srgbClr val="0000FF"/>
-              </a:solidFill>
-              <a:round/>
-              <a:headEnd/>
-              <a:tailEnd/>
-            </a:ln>
-          </p:spPr>
-          <p:txBody>
-            <a:bodyPr/>
-            <a:lstStyle/>
-            <a:p>
-              <a:endParaRPr lang="es-ES"/>
-            </a:p>
-          </p:txBody>
-        </p:sp>
-        <p:sp>
-          <p:nvSpPr>
-            <p:cNvPr id="136" name="AutoShape 36"/>
-            <p:cNvSpPr>
-              <a:spLocks noChangeArrowheads="1"/>
-            </p:cNvSpPr>
-            <p:nvPr/>
-          </p:nvSpPr>
-          <p:spPr bwMode="auto">
-            <a:xfrm rot="14678705" flipV="1">
-              <a:off x="8004311" y="3301573"/>
-              <a:ext cx="214315" cy="142876"/>
-            </a:xfrm>
-            <a:prstGeom prst="triangle">
-              <a:avLst>
-                <a:gd name="adj" fmla="val 50000"/>
-              </a:avLst>
-            </a:prstGeom>
-            <a:solidFill>
-              <a:srgbClr val="FF0000"/>
-            </a:solidFill>
-            <a:ln w="9525">
-              <a:solidFill>
-                <a:srgbClr val="FF0000"/>
-              </a:solidFill>
-              <a:miter lim="800000"/>
-              <a:headEnd/>
-              <a:tailEnd/>
-            </a:ln>
-          </p:spPr>
-          <p:txBody>
-            <a:bodyPr/>
-            <a:lstStyle/>
-            <a:p>
-              <a:endParaRPr lang="es-ES"/>
-            </a:p>
-          </p:txBody>
-        </p:sp>
-      </p:grpSp>
-      <p:sp>
-        <p:nvSpPr>
-          <p:cNvPr id="145" name="Oval 14"/>
+            <a:miter lim="800000"/>
+            <a:headEnd/>
+            <a:tailEnd/>
+          </a:ln>
+        </p:spPr>
+        <p:txBody>
+          <a:bodyPr/>
+          <a:lstStyle/>
+          <a:p>
+            <a:endParaRPr lang="es-ES"/>
+          </a:p>
+        </p:txBody>
+      </p:sp>
+      <p:sp>
+        <p:nvSpPr>
+          <p:cNvPr id="73" name="Oval 35"/>
           <p:cNvSpPr>
             <a:spLocks noChangeArrowheads="1"/>
           </p:cNvSpPr>
           <p:nvPr/>
         </p:nvSpPr>
         <p:spPr bwMode="auto">
-          <a:xfrm>
-            <a:off x="8001024" y="2285992"/>
-            <a:ext cx="71438" cy="71438"/>
+          <a:xfrm rot="10800000">
+            <a:off x="5929322" y="2357430"/>
+            <a:ext cx="142877" cy="145426"/>
           </a:xfrm>
           <a:prstGeom prst="ellipse">
             <a:avLst/>
           </a:prstGeom>
           <a:solidFill>
-            <a:srgbClr val="000000"/>
+            <a:srgbClr val="0000FF"/>
           </a:solidFill>
-          <a:ln w="9360">
-            <a:solidFill>
-              <a:srgbClr val="000000"/>
-            </a:solidFill>
-            <a:miter lim="800000"/>
+          <a:ln w="9525">
+            <a:solidFill>
+              <a:srgbClr val="0000FF"/>
+            </a:solidFill>
+            <a:round/>
             <a:headEnd/>
             <a:tailEnd/>
           </a:ln>
         </p:spPr>
         <p:txBody>
-          <a:bodyPr wrap="none" anchor="ctr"/>
-          <a:lstStyle/>
-          <a:p>
-            <a:endParaRPr lang="es-ES"/>
-          </a:p>
-        </p:txBody>
-      </p:sp>
-      <p:sp>
-        <p:nvSpPr>
-          <p:cNvPr id="146" name="Oval 14"/>
+          <a:bodyPr/>
+          <a:lstStyle/>
+          <a:p>
+            <a:endParaRPr lang="es-ES"/>
+          </a:p>
+        </p:txBody>
+      </p:sp>
+      <p:sp>
+        <p:nvSpPr>
+          <p:cNvPr id="74" name="Oval 35"/>
           <p:cNvSpPr>
             <a:spLocks noChangeArrowheads="1"/>
           </p:cNvSpPr>
           <p:nvPr/>
         </p:nvSpPr>
         <p:spPr bwMode="auto">
-          <a:xfrm>
-            <a:off x="7929586" y="4714884"/>
-            <a:ext cx="71438" cy="71438"/>
+          <a:xfrm rot="10800000">
+            <a:off x="8072462" y="2428868"/>
+            <a:ext cx="142877" cy="145426"/>
           </a:xfrm>
           <a:prstGeom prst="ellipse">
             <a:avLst/>
           </a:prstGeom>
           <a:solidFill>
-            <a:srgbClr val="000000"/>
+            <a:srgbClr val="0000FF"/>
           </a:solidFill>
-          <a:ln w="9360">
-            <a:solidFill>
-              <a:srgbClr val="000000"/>
-            </a:solidFill>
-            <a:miter lim="800000"/>
+          <a:ln w="9525">
+            <a:solidFill>
+              <a:srgbClr val="0000FF"/>
+            </a:solidFill>
+            <a:round/>
             <a:headEnd/>
             <a:tailEnd/>
           </a:ln>
         </p:spPr>
         <p:txBody>
-          <a:bodyPr wrap="none" anchor="ctr"/>
-          <a:lstStyle/>
-          <a:p>
-            <a:endParaRPr lang="es-ES"/>
+          <a:bodyPr/>
+          <a:lstStyle/>
+          <a:p>
+            <a:endParaRPr lang="es-ES"/>
+          </a:p>
+        </p:txBody>
+      </p:sp>
+      <p:sp>
+        <p:nvSpPr>
+          <p:cNvPr id="76" name="2 Título"/>
+          <p:cNvSpPr>
+            <a:spLocks noGrp="1"/>
+          </p:cNvSpPr>
+          <p:nvPr>
+            <p:ph type="title"/>
+          </p:nvPr>
+        </p:nvSpPr>
+        <p:spPr>
+          <a:xfrm>
+            <a:off x="500034" y="785794"/>
+            <a:ext cx="8229600" cy="428628"/>
+          </a:xfrm>
+        </p:spPr>
+        <p:style>
+          <a:lnRef idx="1">
+            <a:schemeClr val="accent2"/>
+          </a:lnRef>
+          <a:fillRef idx="3">
+            <a:schemeClr val="accent2"/>
+          </a:fillRef>
+          <a:effectRef idx="2">
+            <a:schemeClr val="accent2"/>
+          </a:effectRef>
+          <a:fontRef idx="minor">
+            <a:schemeClr val="lt1"/>
+          </a:fontRef>
+        </p:style>
+        <p:txBody>
+          <a:bodyPr>
+            <a:noAutofit/>
+          </a:bodyPr>
+          <a:lstStyle/>
+          <a:p>
+            <a:r>
+              <a:rPr lang="es-ES" sz="2800" dirty="0" smtClean="0"/>
+              <a:t>Trabajo </a:t>
+            </a:r>
+            <a:r>
+              <a:rPr lang="es-ES" sz="2800" dirty="0" smtClean="0"/>
+              <a:t>del Avanzado</a:t>
+            </a:r>
+            <a:endParaRPr lang="es-ES" sz="2800" dirty="0"/>
           </a:p>
         </p:txBody>
       </p:sp>
@@ -8575,7 +7487,11 @@
           <a:p>
             <a:r>
               <a:rPr lang="es-ES" sz="2800" dirty="0" smtClean="0"/>
-              <a:t>Trabajo de los 2º defensores</a:t>
+              <a:t>Trabajo </a:t>
+            </a:r>
+            <a:r>
+              <a:rPr lang="es-ES" sz="2800" dirty="0" smtClean="0"/>
+              <a:t>del Avanzado</a:t>
             </a:r>
             <a:endParaRPr lang="es-ES" sz="2800" dirty="0"/>
           </a:p>

</xml_diff>